<commit_message>
2nd revised, add 5 porter & nutrion value
</commit_message>
<xml_diff>
--- a/Logo-powerpoint/3rd presentation (revised).pptx
+++ b/Logo-powerpoint/3rd presentation (revised).pptx
@@ -5,7 +5,7 @@
     <p:sldMasterId id="2147483648" r:id="rId1"/>
   </p:sldMasterIdLst>
   <p:notesMasterIdLst>
-    <p:notesMasterId r:id="rId13"/>
+    <p:notesMasterId r:id="rId16"/>
   </p:notesMasterIdLst>
   <p:sldIdLst>
     <p:sldId id="265" r:id="rId2"/>
@@ -17,8 +17,11 @@
     <p:sldId id="271" r:id="rId8"/>
     <p:sldId id="272" r:id="rId9"/>
     <p:sldId id="273" r:id="rId10"/>
-    <p:sldId id="274" r:id="rId11"/>
-    <p:sldId id="275" r:id="rId12"/>
+    <p:sldId id="279" r:id="rId11"/>
+    <p:sldId id="274" r:id="rId12"/>
+    <p:sldId id="275" r:id="rId13"/>
+    <p:sldId id="276" r:id="rId14"/>
+    <p:sldId id="277" r:id="rId15"/>
   </p:sldIdLst>
   <p:sldSz cx="9144000" cy="5143500" type="screen16x9"/>
   <p:notesSz cx="6858000" cy="9144000"/>
@@ -165,14 +168,7 @@
           </a:p>
         </c:rich>
       </c:tx>
-      <c:layout>
-        <c:manualLayout>
-          <c:xMode val="edge"/>
-          <c:yMode val="edge"/>
-          <c:x val="0.18731050664121529"/>
-          <c:y val="2.2649881578571906E-2"/>
-        </c:manualLayout>
-      </c:layout>
+      <c:layout/>
       <c:overlay val="0"/>
     </c:title>
     <c:autoTitleDeleted val="0"/>
@@ -183,9 +179,9 @@
           <c:xMode val="edge"/>
           <c:yMode val="edge"/>
           <c:x val="8.607174103237096E-2"/>
-          <c:y val="0.13706864162536975"/>
+          <c:y val="0.12574365723283132"/>
           <c:w val="0.88337270341207352"/>
-          <c:h val="0.70266828683667359"/>
+          <c:h val="0.74033177890871849"/>
         </c:manualLayout>
       </c:layout>
       <c:barChart>
@@ -308,7 +304,7 @@
                   <c:v>860</c:v>
                 </c:pt>
                 <c:pt idx="2">
-                  <c:v>9.6000000000000014</c:v>
+                  <c:v>3.2</c:v>
                 </c:pt>
                 <c:pt idx="3">
                   <c:v>4.5</c:v>
@@ -336,11 +332,11 @@
           <c:showBubbleSize val="0"/>
         </c:dLbls>
         <c:gapWidth val="150"/>
-        <c:axId val="111307264"/>
-        <c:axId val="83880192"/>
+        <c:axId val="54116352"/>
+        <c:axId val="89134720"/>
       </c:barChart>
       <c:catAx>
-        <c:axId val="111307264"/>
+        <c:axId val="54116352"/>
         <c:scaling>
           <c:orientation val="minMax"/>
         </c:scaling>
@@ -349,7 +345,7 @@
         <c:majorTickMark val="out"/>
         <c:minorTickMark val="none"/>
         <c:tickLblPos val="nextTo"/>
-        <c:crossAx val="83880192"/>
+        <c:crossAx val="89134720"/>
         <c:crosses val="autoZero"/>
         <c:auto val="1"/>
         <c:lblAlgn val="ctr"/>
@@ -357,7 +353,7 @@
         <c:noMultiLvlLbl val="0"/>
       </c:catAx>
       <c:valAx>
-        <c:axId val="83880192"/>
+        <c:axId val="89134720"/>
         <c:scaling>
           <c:orientation val="minMax"/>
           <c:max val="900"/>
@@ -368,7 +364,7 @@
         <c:majorTickMark val="out"/>
         <c:minorTickMark val="none"/>
         <c:tickLblPos val="nextTo"/>
-        <c:crossAx val="111307264"/>
+        <c:crossAx val="54116352"/>
         <c:crosses val="autoZero"/>
         <c:crossBetween val="between"/>
       </c:valAx>
@@ -489,11 +485,11 @@
           <c:showBubbleSize val="0"/>
         </c:dLbls>
         <c:gapWidth val="150"/>
-        <c:axId val="163995648"/>
-        <c:axId val="113184128"/>
+        <c:axId val="54116864"/>
+        <c:axId val="56008704"/>
       </c:barChart>
       <c:catAx>
-        <c:axId val="163995648"/>
+        <c:axId val="54116864"/>
         <c:scaling>
           <c:orientation val="minMax"/>
         </c:scaling>
@@ -502,7 +498,7 @@
         <c:majorTickMark val="out"/>
         <c:minorTickMark val="none"/>
         <c:tickLblPos val="nextTo"/>
-        <c:crossAx val="113184128"/>
+        <c:crossAx val="56008704"/>
         <c:crosses val="autoZero"/>
         <c:auto val="1"/>
         <c:lblAlgn val="ctr"/>
@@ -510,7 +506,7 @@
         <c:noMultiLvlLbl val="0"/>
       </c:catAx>
       <c:valAx>
-        <c:axId val="113184128"/>
+        <c:axId val="56008704"/>
         <c:scaling>
           <c:orientation val="minMax"/>
         </c:scaling>
@@ -520,7 +516,7 @@
         <c:majorTickMark val="out"/>
         <c:minorTickMark val="none"/>
         <c:tickLblPos val="nextTo"/>
-        <c:crossAx val="163995648"/>
+        <c:crossAx val="54116864"/>
         <c:crosses val="autoZero"/>
         <c:crossBetween val="between"/>
       </c:valAx>
@@ -785,11 +781,11 @@
           <c:showBubbleSize val="0"/>
         </c:dLbls>
         <c:gapWidth val="150"/>
-        <c:axId val="131489792"/>
-        <c:axId val="83881920"/>
+        <c:axId val="108813824"/>
+        <c:axId val="56013888"/>
       </c:barChart>
       <c:catAx>
-        <c:axId val="131489792"/>
+        <c:axId val="108813824"/>
         <c:scaling>
           <c:orientation val="minMax"/>
         </c:scaling>
@@ -798,7 +794,7 @@
         <c:majorTickMark val="out"/>
         <c:minorTickMark val="none"/>
         <c:tickLblPos val="nextTo"/>
-        <c:crossAx val="83881920"/>
+        <c:crossAx val="56013888"/>
         <c:crosses val="autoZero"/>
         <c:auto val="1"/>
         <c:lblAlgn val="ctr"/>
@@ -806,7 +802,7 @@
         <c:noMultiLvlLbl val="0"/>
       </c:catAx>
       <c:valAx>
-        <c:axId val="83881920"/>
+        <c:axId val="56013888"/>
         <c:scaling>
           <c:orientation val="minMax"/>
           <c:max val="30"/>
@@ -817,7 +813,7 @@
         <c:majorTickMark val="out"/>
         <c:minorTickMark val="none"/>
         <c:tickLblPos val="nextTo"/>
-        <c:crossAx val="131489792"/>
+        <c:crossAx val="108813824"/>
         <c:crosses val="autoZero"/>
         <c:crossBetween val="between"/>
       </c:valAx>
@@ -924,11 +920,11 @@
           <c:showBubbleSize val="0"/>
         </c:dLbls>
         <c:gapWidth val="150"/>
-        <c:axId val="146617856"/>
-        <c:axId val="113238016"/>
+        <c:axId val="108855296"/>
+        <c:axId val="56015616"/>
       </c:barChart>
       <c:catAx>
-        <c:axId val="146617856"/>
+        <c:axId val="108855296"/>
         <c:scaling>
           <c:orientation val="minMax"/>
         </c:scaling>
@@ -937,7 +933,7 @@
         <c:majorTickMark val="out"/>
         <c:minorTickMark val="none"/>
         <c:tickLblPos val="nextTo"/>
-        <c:crossAx val="113238016"/>
+        <c:crossAx val="56015616"/>
         <c:crosses val="autoZero"/>
         <c:auto val="1"/>
         <c:lblAlgn val="ctr"/>
@@ -945,7 +941,7 @@
         <c:noMultiLvlLbl val="0"/>
       </c:catAx>
       <c:valAx>
-        <c:axId val="113238016"/>
+        <c:axId val="56015616"/>
         <c:scaling>
           <c:orientation val="minMax"/>
         </c:scaling>
@@ -955,7 +951,7 @@
         <c:majorTickMark val="out"/>
         <c:minorTickMark val="none"/>
         <c:tickLblPos val="nextTo"/>
-        <c:crossAx val="146617856"/>
+        <c:crossAx val="108855296"/>
         <c:crosses val="autoZero"/>
         <c:crossBetween val="between"/>
       </c:valAx>
@@ -964,6 +960,629 @@
     <c:dispBlanksAs val="gap"/>
     <c:showDLblsOverMax val="0"/>
   </c:chart>
+  <c:externalData r:id="rId1">
+    <c:autoUpdate val="0"/>
+  </c:externalData>
+</c:chartSpace>
+</file>
+
+<file path=ppt/charts/chart5.xml><?xml version="1.0" encoding="utf-8"?>
+<c:chartSpace xmlns:c="http://schemas.openxmlformats.org/drawingml/2006/chart" xmlns:a="http://schemas.openxmlformats.org/drawingml/2006/main" xmlns:r="http://schemas.openxmlformats.org/officeDocument/2006/relationships">
+  <c:date1904 val="0"/>
+  <c:lang val="en-US"/>
+  <c:roundedCorners val="0"/>
+  <mc:AlternateContent xmlns:mc="http://schemas.openxmlformats.org/markup-compatibility/2006">
+    <mc:Choice xmlns:c14="http://schemas.microsoft.com/office/drawing/2007/8/2/chart" Requires="c14">
+      <c14:style val="102"/>
+    </mc:Choice>
+    <mc:Fallback>
+      <c:style val="2"/>
+    </mc:Fallback>
+  </mc:AlternateContent>
+  <c:chart>
+    <c:autoTitleDeleted val="0"/>
+    <c:plotArea>
+      <c:layout>
+        <c:manualLayout>
+          <c:layoutTarget val="inner"/>
+          <c:xMode val="edge"/>
+          <c:yMode val="edge"/>
+          <c:x val="9.494949494949495E-2"/>
+          <c:y val="8.5784313725490204E-3"/>
+          <c:w val="0.83030303030303032"/>
+          <c:h val="0.99142156862745101"/>
+        </c:manualLayout>
+      </c:layout>
+      <c:doughnutChart>
+        <c:varyColors val="1"/>
+        <c:ser>
+          <c:idx val="0"/>
+          <c:order val="0"/>
+          <c:dPt>
+            <c:idx val="0"/>
+            <c:bubble3D val="0"/>
+            <c:spPr>
+              <a:solidFill>
+                <a:srgbClr val="505050"/>
+              </a:solidFill>
+            </c:spPr>
+          </c:dPt>
+          <c:dPt>
+            <c:idx val="1"/>
+            <c:bubble3D val="0"/>
+            <c:spPr>
+              <a:noFill/>
+              <a:ln>
+                <a:noFill/>
+              </a:ln>
+            </c:spPr>
+          </c:dPt>
+          <c:dLbls>
+            <c:dLbl>
+              <c:idx val="0"/>
+              <c:layout>
+                <c:manualLayout>
+                  <c:x val="-3.0179634325370346E-2"/>
+                  <c:y val="0.24591516134012661"/>
+                </c:manualLayout>
+              </c:layout>
+              <c:spPr/>
+              <c:txPr>
+                <a:bodyPr/>
+                <a:lstStyle/>
+                <a:p>
+                  <a:pPr>
+                    <a:defRPr sz="1400"/>
+                  </a:pPr>
+                  <a:endParaRPr lang="en-US"/>
+                </a:p>
+              </c:txPr>
+              <c:showLegendKey val="0"/>
+              <c:showVal val="1"/>
+              <c:showCatName val="0"/>
+              <c:showSerName val="0"/>
+              <c:showPercent val="0"/>
+              <c:showBubbleSize val="0"/>
+            </c:dLbl>
+            <c:dLbl>
+              <c:idx val="1"/>
+              <c:delete val="1"/>
+            </c:dLbl>
+            <c:showLegendKey val="0"/>
+            <c:showVal val="1"/>
+            <c:showCatName val="0"/>
+            <c:showSerName val="0"/>
+            <c:showPercent val="0"/>
+            <c:showBubbleSize val="0"/>
+            <c:showLeaderLines val="1"/>
+          </c:dLbls>
+          <c:val>
+            <c:numRef>
+              <c:f>'Nutritional value'!$E$38:$F$38</c:f>
+              <c:numCache>
+                <c:formatCode>0%</c:formatCode>
+                <c:ptCount val="2"/>
+                <c:pt idx="0">
+                  <c:v>0.57882352941176474</c:v>
+                </c:pt>
+                <c:pt idx="1">
+                  <c:v>0.42117647058823526</c:v>
+                </c:pt>
+              </c:numCache>
+            </c:numRef>
+          </c:val>
+        </c:ser>
+        <c:ser>
+          <c:idx val="1"/>
+          <c:order val="1"/>
+          <c:dPt>
+            <c:idx val="0"/>
+            <c:bubble3D val="0"/>
+            <c:spPr>
+              <a:solidFill>
+                <a:srgbClr val="FF7260"/>
+              </a:solidFill>
+            </c:spPr>
+          </c:dPt>
+          <c:dPt>
+            <c:idx val="1"/>
+            <c:bubble3D val="0"/>
+            <c:spPr>
+              <a:noFill/>
+            </c:spPr>
+          </c:dPt>
+          <c:dLbls>
+            <c:dLbl>
+              <c:idx val="0"/>
+              <c:layout>
+                <c:manualLayout>
+                  <c:x val="8.3380221540104091E-2"/>
+                  <c:y val="-8.4967191601049874E-2"/>
+                </c:manualLayout>
+              </c:layout>
+              <c:showLegendKey val="0"/>
+              <c:showVal val="1"/>
+              <c:showCatName val="0"/>
+              <c:showSerName val="0"/>
+              <c:showPercent val="0"/>
+              <c:showBubbleSize val="0"/>
+            </c:dLbl>
+            <c:dLbl>
+              <c:idx val="1"/>
+              <c:delete val="1"/>
+            </c:dLbl>
+            <c:txPr>
+              <a:bodyPr/>
+              <a:lstStyle/>
+              <a:p>
+                <a:pPr>
+                  <a:defRPr sz="1400"/>
+                </a:pPr>
+                <a:endParaRPr lang="en-US"/>
+              </a:p>
+            </c:txPr>
+            <c:showLegendKey val="0"/>
+            <c:showVal val="1"/>
+            <c:showCatName val="0"/>
+            <c:showSerName val="0"/>
+            <c:showPercent val="0"/>
+            <c:showBubbleSize val="0"/>
+            <c:showLeaderLines val="1"/>
+          </c:dLbls>
+          <c:val>
+            <c:numRef>
+              <c:f>'Nutritional value'!$E$39:$F$39</c:f>
+              <c:numCache>
+                <c:formatCode>0%</c:formatCode>
+                <c:ptCount val="2"/>
+                <c:pt idx="0">
+                  <c:v>0.29493212669683261</c:v>
+                </c:pt>
+                <c:pt idx="1">
+                  <c:v>0.70506787330316745</c:v>
+                </c:pt>
+              </c:numCache>
+            </c:numRef>
+          </c:val>
+        </c:ser>
+        <c:dLbls>
+          <c:showLegendKey val="0"/>
+          <c:showVal val="1"/>
+          <c:showCatName val="0"/>
+          <c:showSerName val="0"/>
+          <c:showPercent val="0"/>
+          <c:showBubbleSize val="0"/>
+          <c:showLeaderLines val="1"/>
+        </c:dLbls>
+        <c:firstSliceAng val="360"/>
+        <c:holeSize val="78"/>
+      </c:doughnutChart>
+    </c:plotArea>
+    <c:plotVisOnly val="1"/>
+    <c:dispBlanksAs val="gap"/>
+    <c:showDLblsOverMax val="0"/>
+  </c:chart>
+  <c:spPr>
+    <a:ln>
+      <a:noFill/>
+    </a:ln>
+  </c:spPr>
+  <c:externalData r:id="rId1">
+    <c:autoUpdate val="0"/>
+  </c:externalData>
+  <c:userShapes r:id="rId2"/>
+</c:chartSpace>
+</file>
+
+<file path=ppt/charts/chart6.xml><?xml version="1.0" encoding="utf-8"?>
+<c:chartSpace xmlns:c="http://schemas.openxmlformats.org/drawingml/2006/chart" xmlns:a="http://schemas.openxmlformats.org/drawingml/2006/main" xmlns:r="http://schemas.openxmlformats.org/officeDocument/2006/relationships">
+  <c:date1904 val="0"/>
+  <c:lang val="en-US"/>
+  <c:roundedCorners val="0"/>
+  <mc:AlternateContent xmlns:mc="http://schemas.openxmlformats.org/markup-compatibility/2006">
+    <mc:Choice xmlns:c14="http://schemas.microsoft.com/office/drawing/2007/8/2/chart" Requires="c14">
+      <c14:style val="102"/>
+    </mc:Choice>
+    <mc:Fallback>
+      <c:style val="2"/>
+    </mc:Fallback>
+  </mc:AlternateContent>
+  <c:chart>
+    <c:autoTitleDeleted val="1"/>
+    <c:plotArea>
+      <c:layout>
+        <c:manualLayout>
+          <c:layoutTarget val="inner"/>
+          <c:xMode val="edge"/>
+          <c:yMode val="edge"/>
+          <c:x val="9.494949494949495E-2"/>
+          <c:y val="8.5784313725490204E-3"/>
+          <c:w val="0.83030303030303032"/>
+          <c:h val="0.99142156862745101"/>
+        </c:manualLayout>
+      </c:layout>
+      <c:doughnutChart>
+        <c:varyColors val="1"/>
+        <c:ser>
+          <c:idx val="0"/>
+          <c:order val="0"/>
+          <c:dPt>
+            <c:idx val="0"/>
+            <c:bubble3D val="0"/>
+            <c:spPr>
+              <a:solidFill>
+                <a:srgbClr val="505050"/>
+              </a:solidFill>
+            </c:spPr>
+          </c:dPt>
+          <c:dPt>
+            <c:idx val="1"/>
+            <c:bubble3D val="0"/>
+            <c:spPr>
+              <a:noFill/>
+              <a:ln>
+                <a:noFill/>
+              </a:ln>
+            </c:spPr>
+          </c:dPt>
+          <c:dLbls>
+            <c:dLbl>
+              <c:idx val="0"/>
+              <c:layout>
+                <c:manualLayout>
+                  <c:x val="-2.1139730415054049E-2"/>
+                  <c:y val="0.35375829859502866"/>
+                </c:manualLayout>
+              </c:layout>
+              <c:spPr/>
+              <c:txPr>
+                <a:bodyPr/>
+                <a:lstStyle/>
+                <a:p>
+                  <a:pPr>
+                    <a:defRPr sz="1400"/>
+                  </a:pPr>
+                  <a:endParaRPr lang="en-US"/>
+                </a:p>
+              </c:txPr>
+              <c:showLegendKey val="0"/>
+              <c:showVal val="1"/>
+              <c:showCatName val="0"/>
+              <c:showSerName val="0"/>
+              <c:showPercent val="0"/>
+              <c:showBubbleSize val="0"/>
+            </c:dLbl>
+            <c:dLbl>
+              <c:idx val="1"/>
+              <c:delete val="1"/>
+            </c:dLbl>
+            <c:showLegendKey val="0"/>
+            <c:showVal val="1"/>
+            <c:showCatName val="0"/>
+            <c:showSerName val="0"/>
+            <c:showPercent val="0"/>
+            <c:showBubbleSize val="0"/>
+            <c:showLeaderLines val="1"/>
+          </c:dLbls>
+          <c:val>
+            <c:numRef>
+              <c:f>'Nutritional value'!$C$38:$D$38</c:f>
+              <c:numCache>
+                <c:formatCode>0%</c:formatCode>
+                <c:ptCount val="2"/>
+                <c:pt idx="0">
+                  <c:v>0.47399999999999998</c:v>
+                </c:pt>
+                <c:pt idx="1">
+                  <c:v>0.52600000000000002</c:v>
+                </c:pt>
+              </c:numCache>
+            </c:numRef>
+          </c:val>
+        </c:ser>
+        <c:ser>
+          <c:idx val="1"/>
+          <c:order val="1"/>
+          <c:dPt>
+            <c:idx val="0"/>
+            <c:bubble3D val="0"/>
+            <c:spPr>
+              <a:solidFill>
+                <a:srgbClr val="FF7260"/>
+              </a:solidFill>
+            </c:spPr>
+          </c:dPt>
+          <c:dPt>
+            <c:idx val="1"/>
+            <c:bubble3D val="0"/>
+            <c:spPr>
+              <a:noFill/>
+            </c:spPr>
+          </c:dPt>
+          <c:dLbls>
+            <c:dLbl>
+              <c:idx val="0"/>
+              <c:layout>
+                <c:manualLayout>
+                  <c:x val="8.3380221540104091E-2"/>
+                  <c:y val="-8.4967191601049874E-2"/>
+                </c:manualLayout>
+              </c:layout>
+              <c:showLegendKey val="0"/>
+              <c:showVal val="1"/>
+              <c:showCatName val="0"/>
+              <c:showSerName val="0"/>
+              <c:showPercent val="0"/>
+              <c:showBubbleSize val="0"/>
+            </c:dLbl>
+            <c:dLbl>
+              <c:idx val="1"/>
+              <c:delete val="1"/>
+            </c:dLbl>
+            <c:txPr>
+              <a:bodyPr/>
+              <a:lstStyle/>
+              <a:p>
+                <a:pPr>
+                  <a:defRPr sz="1400"/>
+                </a:pPr>
+                <a:endParaRPr lang="en-US"/>
+              </a:p>
+            </c:txPr>
+            <c:showLegendKey val="0"/>
+            <c:showVal val="1"/>
+            <c:showCatName val="0"/>
+            <c:showSerName val="0"/>
+            <c:showPercent val="0"/>
+            <c:showBubbleSize val="0"/>
+            <c:showLeaderLines val="1"/>
+          </c:dLbls>
+          <c:val>
+            <c:numRef>
+              <c:f>'Nutritional value'!$C$39:$D$39</c:f>
+              <c:numCache>
+                <c:formatCode>0%</c:formatCode>
+                <c:ptCount val="2"/>
+                <c:pt idx="0">
+                  <c:v>8.3076923076923076E-2</c:v>
+                </c:pt>
+                <c:pt idx="1">
+                  <c:v>0.91692307692307695</c:v>
+                </c:pt>
+              </c:numCache>
+            </c:numRef>
+          </c:val>
+        </c:ser>
+        <c:dLbls>
+          <c:showLegendKey val="0"/>
+          <c:showVal val="1"/>
+          <c:showCatName val="0"/>
+          <c:showSerName val="0"/>
+          <c:showPercent val="0"/>
+          <c:showBubbleSize val="0"/>
+          <c:showLeaderLines val="1"/>
+        </c:dLbls>
+        <c:firstSliceAng val="2"/>
+        <c:holeSize val="78"/>
+      </c:doughnutChart>
+    </c:plotArea>
+    <c:plotVisOnly val="1"/>
+    <c:dispBlanksAs val="gap"/>
+    <c:showDLblsOverMax val="0"/>
+  </c:chart>
+  <c:spPr>
+    <a:ln>
+      <a:noFill/>
+    </a:ln>
+  </c:spPr>
+  <c:externalData r:id="rId1">
+    <c:autoUpdate val="0"/>
+  </c:externalData>
+  <c:userShapes r:id="rId2"/>
+</c:chartSpace>
+</file>
+
+<file path=ppt/charts/chart7.xml><?xml version="1.0" encoding="utf-8"?>
+<c:chartSpace xmlns:c="http://schemas.openxmlformats.org/drawingml/2006/chart" xmlns:a="http://schemas.openxmlformats.org/drawingml/2006/main" xmlns:r="http://schemas.openxmlformats.org/officeDocument/2006/relationships">
+  <c:date1904 val="0"/>
+  <c:lang val="en-US"/>
+  <c:roundedCorners val="0"/>
+  <mc:AlternateContent xmlns:mc="http://schemas.openxmlformats.org/markup-compatibility/2006">
+    <mc:Choice xmlns:c14="http://schemas.microsoft.com/office/drawing/2007/8/2/chart" Requires="c14">
+      <c14:style val="102"/>
+    </mc:Choice>
+    <mc:Fallback>
+      <c:style val="2"/>
+    </mc:Fallback>
+  </mc:AlternateContent>
+  <c:chart>
+    <c:autoTitleDeleted val="1"/>
+    <c:plotArea>
+      <c:layout>
+        <c:manualLayout>
+          <c:layoutTarget val="inner"/>
+          <c:xMode val="edge"/>
+          <c:yMode val="edge"/>
+          <c:x val="9.494949494949495E-2"/>
+          <c:y val="8.5784313725490204E-3"/>
+          <c:w val="0.83030303030303032"/>
+          <c:h val="0.99142156862745101"/>
+        </c:manualLayout>
+      </c:layout>
+      <c:doughnutChart>
+        <c:varyColors val="1"/>
+        <c:ser>
+          <c:idx val="0"/>
+          <c:order val="0"/>
+          <c:dPt>
+            <c:idx val="0"/>
+            <c:bubble3D val="0"/>
+            <c:spPr>
+              <a:solidFill>
+                <a:srgbClr val="505050"/>
+              </a:solidFill>
+            </c:spPr>
+          </c:dPt>
+          <c:dPt>
+            <c:idx val="1"/>
+            <c:bubble3D val="0"/>
+            <c:spPr>
+              <a:noFill/>
+              <a:ln>
+                <a:noFill/>
+              </a:ln>
+            </c:spPr>
+          </c:dPt>
+          <c:dLbls>
+            <c:dLbl>
+              <c:idx val="0"/>
+              <c:layout>
+                <c:manualLayout>
+                  <c:x val="7.3454990423494362E-2"/>
+                  <c:y val="0.38807202408522473"/>
+                </c:manualLayout>
+              </c:layout>
+              <c:spPr/>
+              <c:txPr>
+                <a:bodyPr/>
+                <a:lstStyle/>
+                <a:p>
+                  <a:pPr>
+                    <a:defRPr sz="1400"/>
+                  </a:pPr>
+                  <a:endParaRPr lang="en-US"/>
+                </a:p>
+              </c:txPr>
+              <c:showLegendKey val="0"/>
+              <c:showVal val="1"/>
+              <c:showCatName val="0"/>
+              <c:showSerName val="0"/>
+              <c:showPercent val="0"/>
+              <c:showBubbleSize val="0"/>
+            </c:dLbl>
+            <c:dLbl>
+              <c:idx val="1"/>
+              <c:delete val="1"/>
+            </c:dLbl>
+            <c:showLegendKey val="0"/>
+            <c:showVal val="1"/>
+            <c:showCatName val="0"/>
+            <c:showSerName val="0"/>
+            <c:showPercent val="0"/>
+            <c:showBubbleSize val="0"/>
+            <c:showLeaderLines val="1"/>
+          </c:dLbls>
+          <c:val>
+            <c:numRef>
+              <c:f>'Nutritional value'!$A$38:$B$38</c:f>
+              <c:numCache>
+                <c:formatCode>0%</c:formatCode>
+                <c:ptCount val="2"/>
+                <c:pt idx="0">
+                  <c:v>0.374</c:v>
+                </c:pt>
+                <c:pt idx="1">
+                  <c:v>0.626</c:v>
+                </c:pt>
+              </c:numCache>
+            </c:numRef>
+          </c:val>
+        </c:ser>
+        <c:ser>
+          <c:idx val="1"/>
+          <c:order val="1"/>
+          <c:dPt>
+            <c:idx val="0"/>
+            <c:bubble3D val="0"/>
+            <c:spPr>
+              <a:solidFill>
+                <a:srgbClr val="FF7260"/>
+              </a:solidFill>
+            </c:spPr>
+          </c:dPt>
+          <c:dPt>
+            <c:idx val="1"/>
+            <c:bubble3D val="0"/>
+            <c:spPr>
+              <a:noFill/>
+            </c:spPr>
+          </c:dPt>
+          <c:dLbls>
+            <c:dLbl>
+              <c:idx val="0"/>
+              <c:layout>
+                <c:manualLayout>
+                  <c:x val="8.3380221540104091E-2"/>
+                  <c:y val="-8.4967191601049874E-2"/>
+                </c:manualLayout>
+              </c:layout>
+              <c:showLegendKey val="0"/>
+              <c:showVal val="1"/>
+              <c:showCatName val="0"/>
+              <c:showSerName val="0"/>
+              <c:showPercent val="0"/>
+              <c:showBubbleSize val="0"/>
+            </c:dLbl>
+            <c:dLbl>
+              <c:idx val="1"/>
+              <c:delete val="1"/>
+            </c:dLbl>
+            <c:txPr>
+              <a:bodyPr/>
+              <a:lstStyle/>
+              <a:p>
+                <a:pPr>
+                  <a:defRPr sz="1400"/>
+                </a:pPr>
+                <a:endParaRPr lang="en-US"/>
+              </a:p>
+            </c:txPr>
+            <c:showLegendKey val="0"/>
+            <c:showVal val="1"/>
+            <c:showCatName val="0"/>
+            <c:showSerName val="0"/>
+            <c:showPercent val="0"/>
+            <c:showBubbleSize val="0"/>
+            <c:showLeaderLines val="1"/>
+          </c:dLbls>
+          <c:val>
+            <c:numRef>
+              <c:f>'Nutritional value'!$A$39:$B$39</c:f>
+              <c:numCache>
+                <c:formatCode>0%</c:formatCode>
+                <c:ptCount val="2"/>
+                <c:pt idx="0">
+                  <c:v>0.20615384615384616</c:v>
+                </c:pt>
+                <c:pt idx="1">
+                  <c:v>0.79384615384615387</c:v>
+                </c:pt>
+              </c:numCache>
+            </c:numRef>
+          </c:val>
+        </c:ser>
+        <c:dLbls>
+          <c:showLegendKey val="0"/>
+          <c:showVal val="1"/>
+          <c:showCatName val="0"/>
+          <c:showSerName val="0"/>
+          <c:showPercent val="0"/>
+          <c:showBubbleSize val="0"/>
+          <c:showLeaderLines val="1"/>
+        </c:dLbls>
+        <c:firstSliceAng val="0"/>
+        <c:holeSize val="78"/>
+      </c:doughnutChart>
+    </c:plotArea>
+    <c:plotVisOnly val="1"/>
+    <c:dispBlanksAs val="gap"/>
+    <c:showDLblsOverMax val="0"/>
+  </c:chart>
+  <c:spPr>
+    <a:ln>
+      <a:noFill/>
+    </a:ln>
+  </c:spPr>
   <c:externalData r:id="rId1">
     <c:autoUpdate val="0"/>
   </c:externalData>
@@ -4076,6 +4695,268 @@
 </dgm:styleDef>
 </file>
 
+<file path=ppt/drawings/drawing1.xml><?xml version="1.0" encoding="utf-8"?>
+<c:userShapes xmlns:c="http://schemas.openxmlformats.org/drawingml/2006/chart">
+  <cdr:relSizeAnchor xmlns:cdr="http://schemas.openxmlformats.org/drawingml/2006/chartDrawing">
+    <cdr:from>
+      <cdr:x>0.00194</cdr:x>
+      <cdr:y>0.3927</cdr:y>
+    </cdr:from>
+    <cdr:to>
+      <cdr:x>0.9997</cdr:x>
+      <cdr:y>0.57089</cdr:y>
+    </cdr:to>
+    <cdr:sp macro="" textlink="">
+      <cdr:nvSpPr>
+        <cdr:cNvPr id="2" name="TextBox 12"/>
+        <cdr:cNvSpPr txBox="1"/>
+      </cdr:nvSpPr>
+      <cdr:spPr>
+        <a:xfrm xmlns:a="http://schemas.openxmlformats.org/drawingml/2006/main">
+          <a:off x="5450" y="1017405"/>
+          <a:ext cx="2803596" cy="461665"/>
+        </a:xfrm>
+        <a:prstGeom xmlns:a="http://schemas.openxmlformats.org/drawingml/2006/main" prst="rect">
+          <a:avLst/>
+        </a:prstGeom>
+        <a:noFill xmlns:a="http://schemas.openxmlformats.org/drawingml/2006/main"/>
+      </cdr:spPr>
+      <cdr:txBody>
+        <a:bodyPr xmlns:a="http://schemas.openxmlformats.org/drawingml/2006/main" wrap="square" rtlCol="0">
+          <a:spAutoFit/>
+        </a:bodyPr>
+        <a:lstStyle xmlns:a="http://schemas.openxmlformats.org/drawingml/2006/main">
+          <a:lvl1pPr marL="0" algn="l" rtl="0" latinLnBrk="0">
+            <a:defRPr sz="1800" kern="1200">
+              <a:solidFill>
+                <a:schemeClr val="tx1"/>
+              </a:solidFill>
+              <a:latin typeface="+mn-lt"/>
+              <a:ea typeface="+mn-ea"/>
+              <a:cs typeface="+mn-cs"/>
+            </a:defRPr>
+          </a:lvl1pPr>
+          <a:lvl2pPr marL="457200" algn="l" rtl="0" latinLnBrk="0">
+            <a:defRPr sz="1800" kern="1200">
+              <a:solidFill>
+                <a:schemeClr val="tx1"/>
+              </a:solidFill>
+              <a:latin typeface="+mn-lt"/>
+              <a:ea typeface="+mn-ea"/>
+              <a:cs typeface="+mn-cs"/>
+            </a:defRPr>
+          </a:lvl2pPr>
+          <a:lvl3pPr marL="914400" algn="l" rtl="0" latinLnBrk="0">
+            <a:defRPr sz="1800" kern="1200">
+              <a:solidFill>
+                <a:schemeClr val="tx1"/>
+              </a:solidFill>
+              <a:latin typeface="+mn-lt"/>
+              <a:ea typeface="+mn-ea"/>
+              <a:cs typeface="+mn-cs"/>
+            </a:defRPr>
+          </a:lvl3pPr>
+          <a:lvl4pPr marL="1371600" algn="l" rtl="0" latinLnBrk="0">
+            <a:defRPr sz="1800" kern="1200">
+              <a:solidFill>
+                <a:schemeClr val="tx1"/>
+              </a:solidFill>
+              <a:latin typeface="+mn-lt"/>
+              <a:ea typeface="+mn-ea"/>
+              <a:cs typeface="+mn-cs"/>
+            </a:defRPr>
+          </a:lvl4pPr>
+          <a:lvl5pPr marL="1828800" algn="l" rtl="0" latinLnBrk="0">
+            <a:defRPr sz="1800" kern="1200">
+              <a:solidFill>
+                <a:schemeClr val="tx1"/>
+              </a:solidFill>
+              <a:latin typeface="+mn-lt"/>
+              <a:ea typeface="+mn-ea"/>
+              <a:cs typeface="+mn-cs"/>
+            </a:defRPr>
+          </a:lvl5pPr>
+          <a:lvl6pPr marL="2286000" algn="l" rtl="0" latinLnBrk="0">
+            <a:defRPr sz="1800" kern="1200">
+              <a:solidFill>
+                <a:schemeClr val="tx1"/>
+              </a:solidFill>
+              <a:latin typeface="+mn-lt"/>
+              <a:ea typeface="+mn-ea"/>
+              <a:cs typeface="+mn-cs"/>
+            </a:defRPr>
+          </a:lvl6pPr>
+          <a:lvl7pPr marL="2743200" algn="l" rtl="0" latinLnBrk="0">
+            <a:defRPr sz="1800" kern="1200">
+              <a:solidFill>
+                <a:schemeClr val="tx1"/>
+              </a:solidFill>
+              <a:latin typeface="+mn-lt"/>
+              <a:ea typeface="+mn-ea"/>
+              <a:cs typeface="+mn-cs"/>
+            </a:defRPr>
+          </a:lvl7pPr>
+          <a:lvl8pPr marL="3200400" algn="l" rtl="0" latinLnBrk="0">
+            <a:defRPr sz="1800" kern="1200">
+              <a:solidFill>
+                <a:schemeClr val="tx1"/>
+              </a:solidFill>
+              <a:latin typeface="+mn-lt"/>
+              <a:ea typeface="+mn-ea"/>
+              <a:cs typeface="+mn-cs"/>
+            </a:defRPr>
+          </a:lvl8pPr>
+          <a:lvl9pPr marL="3657600" algn="l" rtl="0" latinLnBrk="0">
+            <a:defRPr sz="1800" kern="1200">
+              <a:solidFill>
+                <a:schemeClr val="tx1"/>
+              </a:solidFill>
+              <a:latin typeface="+mn-lt"/>
+              <a:ea typeface="+mn-ea"/>
+              <a:cs typeface="+mn-cs"/>
+            </a:defRPr>
+          </a:lvl9pPr>
+          <a:extLst/>
+        </a:lstStyle>
+        <a:p xmlns:a="http://schemas.openxmlformats.org/drawingml/2006/main">
+          <a:pPr algn="ctr"/>
+          <a:r>
+            <a:rPr lang="en-US" sz="2400" dirty="0" smtClean="0">
+              <a:solidFill>
+                <a:srgbClr val="129793"/>
+              </a:solidFill>
+            </a:rPr>
+            <a:t>BEEF</a:t>
+          </a:r>
+          <a:endParaRPr lang="en-US" sz="2400" dirty="0">
+            <a:solidFill>
+              <a:srgbClr val="129793"/>
+            </a:solidFill>
+          </a:endParaRPr>
+        </a:p>
+      </cdr:txBody>
+    </cdr:sp>
+  </cdr:relSizeAnchor>
+</c:userShapes>
+</file>
+
+<file path=ppt/drawings/drawing2.xml><?xml version="1.0" encoding="utf-8"?>
+<c:userShapes xmlns:c="http://schemas.openxmlformats.org/drawingml/2006/chart">
+  <cdr:relSizeAnchor xmlns:cdr="http://schemas.openxmlformats.org/drawingml/2006/chartDrawing">
+    <cdr:from>
+      <cdr:x>0.2957</cdr:x>
+      <cdr:y>0.36708</cdr:y>
+    </cdr:from>
+    <cdr:to>
+      <cdr:x>0.72439</cdr:x>
+      <cdr:y>0.54527</cdr:y>
+    </cdr:to>
+    <cdr:sp macro="" textlink="">
+      <cdr:nvSpPr>
+        <cdr:cNvPr id="2" name="TextBox 12"/>
+        <cdr:cNvSpPr txBox="1"/>
+      </cdr:nvSpPr>
+      <cdr:spPr>
+        <a:xfrm xmlns:a="http://schemas.openxmlformats.org/drawingml/2006/main">
+          <a:off x="830885" y="951033"/>
+          <a:ext cx="1204570" cy="461665"/>
+        </a:xfrm>
+        <a:prstGeom xmlns:a="http://schemas.openxmlformats.org/drawingml/2006/main" prst="rect">
+          <a:avLst/>
+        </a:prstGeom>
+        <a:noFill xmlns:a="http://schemas.openxmlformats.org/drawingml/2006/main"/>
+      </cdr:spPr>
+      <cdr:txBody>
+        <a:bodyPr xmlns:a="http://schemas.openxmlformats.org/drawingml/2006/main" wrap="square" rtlCol="0">
+          <a:spAutoFit/>
+        </a:bodyPr>
+        <a:lstStyle xmlns:a="http://schemas.openxmlformats.org/drawingml/2006/main">
+          <a:lvl1pPr marL="0" indent="0">
+            <a:defRPr sz="1100">
+              <a:latin typeface="+mn-lt"/>
+              <a:ea typeface="+mn-ea"/>
+              <a:cs typeface="+mn-cs"/>
+            </a:defRPr>
+          </a:lvl1pPr>
+          <a:lvl2pPr marL="457200" indent="0">
+            <a:defRPr sz="1100">
+              <a:latin typeface="+mn-lt"/>
+              <a:ea typeface="+mn-ea"/>
+              <a:cs typeface="+mn-cs"/>
+            </a:defRPr>
+          </a:lvl2pPr>
+          <a:lvl3pPr marL="914400" indent="0">
+            <a:defRPr sz="1100">
+              <a:latin typeface="+mn-lt"/>
+              <a:ea typeface="+mn-ea"/>
+              <a:cs typeface="+mn-cs"/>
+            </a:defRPr>
+          </a:lvl3pPr>
+          <a:lvl4pPr marL="1371600" indent="0">
+            <a:defRPr sz="1100">
+              <a:latin typeface="+mn-lt"/>
+              <a:ea typeface="+mn-ea"/>
+              <a:cs typeface="+mn-cs"/>
+            </a:defRPr>
+          </a:lvl4pPr>
+          <a:lvl5pPr marL="1828800" indent="0">
+            <a:defRPr sz="1100">
+              <a:latin typeface="+mn-lt"/>
+              <a:ea typeface="+mn-ea"/>
+              <a:cs typeface="+mn-cs"/>
+            </a:defRPr>
+          </a:lvl5pPr>
+          <a:lvl6pPr marL="2286000" indent="0">
+            <a:defRPr sz="1100">
+              <a:latin typeface="+mn-lt"/>
+              <a:ea typeface="+mn-ea"/>
+              <a:cs typeface="+mn-cs"/>
+            </a:defRPr>
+          </a:lvl6pPr>
+          <a:lvl7pPr marL="2743200" indent="0">
+            <a:defRPr sz="1100">
+              <a:latin typeface="+mn-lt"/>
+              <a:ea typeface="+mn-ea"/>
+              <a:cs typeface="+mn-cs"/>
+            </a:defRPr>
+          </a:lvl7pPr>
+          <a:lvl8pPr marL="3200400" indent="0">
+            <a:defRPr sz="1100">
+              <a:latin typeface="+mn-lt"/>
+              <a:ea typeface="+mn-ea"/>
+              <a:cs typeface="+mn-cs"/>
+            </a:defRPr>
+          </a:lvl8pPr>
+          <a:lvl9pPr marL="3657600" indent="0">
+            <a:defRPr sz="1100">
+              <a:latin typeface="+mn-lt"/>
+              <a:ea typeface="+mn-ea"/>
+              <a:cs typeface="+mn-cs"/>
+            </a:defRPr>
+          </a:lvl9pPr>
+        </a:lstStyle>
+        <a:p xmlns:a="http://schemas.openxmlformats.org/drawingml/2006/main">
+          <a:pPr algn="ctr"/>
+          <a:r>
+            <a:rPr lang="en-US" sz="2400" dirty="0" smtClean="0">
+              <a:solidFill>
+                <a:srgbClr val="129793"/>
+              </a:solidFill>
+            </a:rPr>
+            <a:t>BEETLE</a:t>
+          </a:r>
+          <a:endParaRPr lang="en-US" sz="2400" dirty="0">
+            <a:solidFill>
+              <a:srgbClr val="129793"/>
+            </a:solidFill>
+          </a:endParaRPr>
+        </a:p>
+      </cdr:txBody>
+    </cdr:sp>
+  </cdr:relSizeAnchor>
+</c:userShapes>
+</file>
+
 <file path=ppt/notesMasters/notesMaster1.xml><?xml version="1.0" encoding="utf-8"?>
 <p:notesMaster xmlns:a="http://schemas.openxmlformats.org/drawingml/2006/main" xmlns:r="http://schemas.openxmlformats.org/officeDocument/2006/relationships" xmlns:p="http://schemas.openxmlformats.org/presentationml/2006/main">
   <p:cSld>
@@ -4161,7 +5042,7 @@
             <a:fld id="{A8ADFD5B-A66C-449C-B6E8-FB716D07777D}" type="datetimeFigureOut">
               <a:rPr lang="en-US" smtClean="0"/>
               <a:pPr/>
-              <a:t>5/9/2015</a:t>
+              <a:t>5/12/2015</a:t>
             </a:fld>
             <a:endParaRPr lang="en-US"/>
           </a:p>
@@ -4514,7 +5395,7 @@
             <a:fld id="{CA5D3BF3-D352-46FC-8343-31F56E6730EA}" type="slidenum">
               <a:rPr lang="en-US" smtClean="0"/>
               <a:pPr/>
-              <a:t>11</a:t>
+              <a:t>12</a:t>
             </a:fld>
             <a:endParaRPr lang="en-US"/>
           </a:p>
@@ -4804,7 +5685,7 @@
                 </a:solidFill>
               </a:rPr>
               <a:pPr algn="ctr"/>
-              <a:t>5/9/2015</a:t>
+              <a:t>5/12/2015</a:t>
             </a:fld>
             <a:endParaRPr lang="en-US" sz="2000" dirty="0">
               <a:solidFill>
@@ -5001,7 +5882,7 @@
             <a:fld id="{E4606EA6-EFEA-4C30-9264-4F9291A5780D}" type="datetime1">
               <a:rPr lang="en-US" smtClean="0"/>
               <a:pPr/>
-              <a:t>5/9/2015</a:t>
+              <a:t>5/12/2015</a:t>
             </a:fld>
             <a:endParaRPr lang="en-US"/>
           </a:p>
@@ -5432,7 +6313,7 @@
             <a:fld id="{6FCF9F07-3BC7-4570-B054-79111B0A380C}" type="datetime1">
               <a:rPr lang="en-US" smtClean="0"/>
               <a:pPr/>
-              <a:t>5/9/2015</a:t>
+              <a:t>5/12/2015</a:t>
             </a:fld>
             <a:endParaRPr lang="en-US"/>
           </a:p>
@@ -5696,7 +6577,7 @@
             <a:fld id="{E4606EA6-EFEA-4C30-9264-4F9291A5780D}" type="datetime1">
               <a:rPr lang="en-US" smtClean="0"/>
               <a:pPr/>
-              <a:t>5/9/2015</a:t>
+              <a:t>5/12/2015</a:t>
             </a:fld>
             <a:endParaRPr lang="en-US"/>
           </a:p>
@@ -5950,7 +6831,7 @@
             <a:fld id="{E4606EA6-EFEA-4C30-9264-4F9291A5780D}" type="datetime1">
               <a:rPr lang="en-US" smtClean="0"/>
               <a:pPr/>
-              <a:t>5/9/2015</a:t>
+              <a:t>5/12/2015</a:t>
             </a:fld>
             <a:endParaRPr lang="en-US"/>
           </a:p>
@@ -6162,7 +7043,7 @@
             <a:fld id="{6DFADB5D-B7A0-47E3-AD2D-B1A6F8614213}" type="datetime1">
               <a:rPr lang="en-US" smtClean="0"/>
               <a:pPr/>
-              <a:t>5/9/2015</a:t>
+              <a:t>5/12/2015</a:t>
             </a:fld>
             <a:endParaRPr lang="en-US"/>
           </a:p>
@@ -6275,7 +7156,7 @@
             <a:fld id="{72968126-03FC-49C0-B9B8-2B561CCC3D90}" type="datetime1">
               <a:rPr lang="en-US" smtClean="0"/>
               <a:pPr/>
-              <a:t>5/9/2015</a:t>
+              <a:t>5/12/2015</a:t>
             </a:fld>
             <a:endParaRPr lang="en-US"/>
           </a:p>
@@ -6427,7 +7308,7 @@
             <a:fld id="{F49A8198-4617-485E-9585-4840B69DBBA6}" type="datetime1">
               <a:rPr lang="en-US" smtClean="0"/>
               <a:pPr/>
-              <a:t>5/9/2015</a:t>
+              <a:t>5/12/2015</a:t>
             </a:fld>
             <a:endParaRPr lang="en-US"/>
           </a:p>
@@ -7015,7 +7896,7 @@
             <a:fld id="{E4606EA6-EFEA-4C30-9264-4F9291A5780D}" type="datetime1">
               <a:rPr lang="en-US" smtClean="0"/>
               <a:pPr/>
-              <a:t>5/9/2015</a:t>
+              <a:t>5/12/2015</a:t>
             </a:fld>
             <a:endParaRPr lang="en-US"/>
           </a:p>
@@ -7215,7 +8096,7 @@
             <a:fld id="{E4606EA6-EFEA-4C30-9264-4F9291A5780D}" type="datetime1">
               <a:rPr lang="en-US" smtClean="0"/>
               <a:pPr/>
-              <a:t>5/9/2015</a:t>
+              <a:t>5/12/2015</a:t>
             </a:fld>
             <a:endParaRPr lang="en-US" sz="1400" dirty="0">
               <a:solidFill>
@@ -8084,6 +8965,735 @@
       </p:grpSpPr>
       <p:sp>
         <p:nvSpPr>
+          <p:cNvPr id="13" name="Flowchart: Alternate Process 12"/>
+          <p:cNvSpPr/>
+          <p:nvPr/>
+        </p:nvSpPr>
+        <p:spPr>
+          <a:xfrm>
+            <a:off x="5362575" y="3276600"/>
+            <a:ext cx="2971800" cy="1752600"/>
+          </a:xfrm>
+          <a:prstGeom prst="flowChartAlternateProcess">
+            <a:avLst/>
+          </a:prstGeom>
+          <a:solidFill>
+            <a:srgbClr val="129793"/>
+          </a:solidFill>
+          <a:ln>
+            <a:noFill/>
+          </a:ln>
+        </p:spPr>
+        <p:style>
+          <a:lnRef idx="2">
+            <a:schemeClr val="accent1">
+              <a:shade val="50000"/>
+            </a:schemeClr>
+          </a:lnRef>
+          <a:fillRef idx="1">
+            <a:schemeClr val="accent1"/>
+          </a:fillRef>
+          <a:effectRef idx="0">
+            <a:schemeClr val="accent1"/>
+          </a:effectRef>
+          <a:fontRef idx="minor">
+            <a:schemeClr val="lt1"/>
+          </a:fontRef>
+        </p:style>
+        <p:txBody>
+          <a:bodyPr rtlCol="0" anchor="ctr"/>
+          <a:lstStyle/>
+          <a:p>
+            <a:pPr algn="ctr"/>
+            <a:r>
+              <a:rPr lang="en-US" sz="1200" b="1" dirty="0" smtClean="0"/>
+              <a:t>Threat of New Entry:</a:t>
+            </a:r>
+          </a:p>
+          <a:p>
+            <a:pPr marL="285750" indent="-285750">
+              <a:buFont typeface="Wingdings" panose="05000000000000000000" pitchFamily="2" charset="2"/>
+              <a:buChar char="§"/>
+            </a:pPr>
+            <a:r>
+              <a:rPr lang="en-US" sz="1200" dirty="0" smtClean="0"/>
+              <a:t>Pet consumption level producers are moderate – high</a:t>
+            </a:r>
+          </a:p>
+          <a:p>
+            <a:pPr marL="285750" indent="-285750">
+              <a:buFont typeface="Wingdings" panose="05000000000000000000" pitchFamily="2" charset="2"/>
+              <a:buChar char="§"/>
+            </a:pPr>
+            <a:r>
+              <a:rPr lang="en-US" sz="1200" dirty="0" smtClean="0"/>
+              <a:t>They can adjust their processes and produce human consumption level products</a:t>
+            </a:r>
+          </a:p>
+          <a:p>
+            <a:pPr marL="285750" indent="-285750">
+              <a:buFont typeface="Wingdings" panose="05000000000000000000" pitchFamily="2" charset="2"/>
+              <a:buChar char="§"/>
+            </a:pPr>
+            <a:r>
+              <a:rPr lang="en-US" sz="1200" dirty="0" smtClean="0"/>
+              <a:t>Production process is not difficult</a:t>
+            </a:r>
+          </a:p>
+          <a:p>
+            <a:pPr marL="285750" indent="-285750">
+              <a:buFont typeface="Wingdings" panose="05000000000000000000" pitchFamily="2" charset="2"/>
+              <a:buChar char="§"/>
+            </a:pPr>
+            <a:r>
+              <a:rPr lang="en-US" sz="1200" dirty="0" smtClean="0"/>
+              <a:t>No brand recognition</a:t>
+            </a:r>
+          </a:p>
+          <a:p>
+            <a:pPr marL="285750" indent="-285750">
+              <a:buFont typeface="Wingdings" panose="05000000000000000000" pitchFamily="2" charset="2"/>
+              <a:buChar char="§"/>
+            </a:pPr>
+            <a:r>
+              <a:rPr lang="en-US" sz="1200" dirty="0" smtClean="0"/>
+              <a:t>No patents held</a:t>
+            </a:r>
+          </a:p>
+        </p:txBody>
+      </p:sp>
+      <p:sp>
+        <p:nvSpPr>
+          <p:cNvPr id="12" name="Flowchart: Alternate Process 11"/>
+          <p:cNvSpPr/>
+          <p:nvPr/>
+        </p:nvSpPr>
+        <p:spPr>
+          <a:xfrm>
+            <a:off x="5257800" y="1522100"/>
+            <a:ext cx="2286000" cy="1219200"/>
+          </a:xfrm>
+          <a:prstGeom prst="flowChartAlternateProcess">
+            <a:avLst/>
+          </a:prstGeom>
+          <a:solidFill>
+            <a:srgbClr val="129793"/>
+          </a:solidFill>
+          <a:ln>
+            <a:noFill/>
+          </a:ln>
+        </p:spPr>
+        <p:style>
+          <a:lnRef idx="2">
+            <a:schemeClr val="accent1">
+              <a:shade val="50000"/>
+            </a:schemeClr>
+          </a:lnRef>
+          <a:fillRef idx="1">
+            <a:schemeClr val="accent1"/>
+          </a:fillRef>
+          <a:effectRef idx="0">
+            <a:schemeClr val="accent1"/>
+          </a:effectRef>
+          <a:fontRef idx="minor">
+            <a:schemeClr val="lt1"/>
+          </a:fontRef>
+        </p:style>
+        <p:txBody>
+          <a:bodyPr rtlCol="0" anchor="ctr"/>
+          <a:lstStyle/>
+          <a:p>
+            <a:pPr algn="ctr"/>
+            <a:r>
+              <a:rPr lang="en-US" sz="1200" b="1" dirty="0" smtClean="0"/>
+              <a:t>Threat of Substitution:</a:t>
+            </a:r>
+          </a:p>
+          <a:p>
+            <a:pPr marL="285750" indent="-285750">
+              <a:buFont typeface="Wingdings" panose="05000000000000000000" pitchFamily="2" charset="2"/>
+              <a:buChar char="§"/>
+            </a:pPr>
+            <a:r>
+              <a:rPr lang="en-US" sz="1200" dirty="0" smtClean="0"/>
+              <a:t>Few competitor</a:t>
+            </a:r>
+          </a:p>
+          <a:p>
+            <a:pPr marL="285750" indent="-285750">
+              <a:buFont typeface="Wingdings" panose="05000000000000000000" pitchFamily="2" charset="2"/>
+              <a:buChar char="§"/>
+            </a:pPr>
+            <a:r>
+              <a:rPr lang="en-US" sz="1200" dirty="0" smtClean="0"/>
+              <a:t>Innovative product</a:t>
+            </a:r>
+          </a:p>
+          <a:p>
+            <a:pPr marL="285750" indent="-285750">
+              <a:buFont typeface="Wingdings" panose="05000000000000000000" pitchFamily="2" charset="2"/>
+              <a:buChar char="§"/>
+            </a:pPr>
+            <a:r>
+              <a:rPr lang="en-US" sz="1200" dirty="0" smtClean="0"/>
+              <a:t>Small target market</a:t>
+            </a:r>
+          </a:p>
+          <a:p>
+            <a:pPr marL="285750" indent="-285750">
+              <a:buFont typeface="Wingdings" panose="05000000000000000000" pitchFamily="2" charset="2"/>
+              <a:buChar char="§"/>
+            </a:pPr>
+            <a:r>
+              <a:rPr lang="en-US" sz="1200" dirty="0" smtClean="0"/>
+              <a:t>Unique product</a:t>
+            </a:r>
+          </a:p>
+        </p:txBody>
+      </p:sp>
+      <p:sp>
+        <p:nvSpPr>
+          <p:cNvPr id="2" name="Title 1"/>
+          <p:cNvSpPr txBox="1">
+            <a:spLocks/>
+          </p:cNvSpPr>
+          <p:nvPr/>
+        </p:nvSpPr>
+        <p:spPr>
+          <a:xfrm>
+            <a:off x="457200" y="228600"/>
+            <a:ext cx="8229600" cy="1143000"/>
+          </a:xfrm>
+          <a:prstGeom prst="rect">
+            <a:avLst/>
+          </a:prstGeom>
+        </p:spPr>
+        <p:txBody>
+          <a:bodyPr vert="horz" lIns="91440" tIns="45720" rIns="91440" bIns="45720" rtlCol="0" anchor="ctr">
+            <a:normAutofit/>
+          </a:bodyPr>
+          <a:lstStyle>
+            <a:lvl1pPr algn="ctr" defTabSz="914400" rtl="0" eaLnBrk="1" latinLnBrk="0" hangingPunct="1">
+              <a:spcBef>
+                <a:spcPct val="0"/>
+              </a:spcBef>
+              <a:buNone/>
+              <a:defRPr sz="4400" kern="1200">
+                <a:solidFill>
+                  <a:schemeClr val="tx1"/>
+                </a:solidFill>
+                <a:latin typeface="+mj-lt"/>
+                <a:ea typeface="+mj-ea"/>
+                <a:cs typeface="+mj-cs"/>
+              </a:defRPr>
+            </a:lvl1pPr>
+          </a:lstStyle>
+          <a:p>
+            <a:pPr algn="l"/>
+            <a:r>
+              <a:rPr lang="en-US" dirty="0" smtClean="0">
+                <a:solidFill>
+                  <a:srgbClr val="129793"/>
+                </a:solidFill>
+              </a:rPr>
+              <a:t>Content</a:t>
+            </a:r>
+            <a:endParaRPr lang="en-US" dirty="0">
+              <a:solidFill>
+                <a:srgbClr val="129793"/>
+              </a:solidFill>
+            </a:endParaRPr>
+          </a:p>
+        </p:txBody>
+      </p:sp>
+      <p:sp>
+        <p:nvSpPr>
+          <p:cNvPr id="3" name="Right Triangle 2"/>
+          <p:cNvSpPr/>
+          <p:nvPr/>
+        </p:nvSpPr>
+        <p:spPr>
+          <a:xfrm rot="10800000">
+            <a:off x="6096000" y="0"/>
+            <a:ext cx="3048000" cy="1569694"/>
+          </a:xfrm>
+          <a:prstGeom prst="rtTriangle">
+            <a:avLst/>
+          </a:prstGeom>
+          <a:solidFill>
+            <a:srgbClr val="9BD7D5"/>
+          </a:solidFill>
+          <a:ln>
+            <a:solidFill>
+              <a:srgbClr val="9BD7D5"/>
+            </a:solidFill>
+          </a:ln>
+        </p:spPr>
+        <p:style>
+          <a:lnRef idx="2">
+            <a:schemeClr val="accent1">
+              <a:shade val="50000"/>
+            </a:schemeClr>
+          </a:lnRef>
+          <a:fillRef idx="1">
+            <a:schemeClr val="accent1"/>
+          </a:fillRef>
+          <a:effectRef idx="0">
+            <a:schemeClr val="accent1"/>
+          </a:effectRef>
+          <a:fontRef idx="minor">
+            <a:schemeClr val="lt1"/>
+          </a:fontRef>
+        </p:style>
+        <p:txBody>
+          <a:bodyPr rtlCol="0" anchor="ctr"/>
+          <a:lstStyle/>
+          <a:p>
+            <a:pPr algn="ctr"/>
+            <a:endParaRPr lang="en-US"/>
+          </a:p>
+        </p:txBody>
+      </p:sp>
+      <p:pic>
+        <p:nvPicPr>
+          <p:cNvPr id="4" name="Picture 5" descr="C:\Users\Melinda Tjia\Desktop\dll\png\basic.png"/>
+          <p:cNvPicPr>
+            <a:picLocks noChangeAspect="1" noChangeArrowheads="1"/>
+          </p:cNvPicPr>
+          <p:nvPr/>
+        </p:nvPicPr>
+        <p:blipFill>
+          <a:blip r:embed="rId2" cstate="print">
+            <a:biLevel thresh="25000"/>
+            <a:extLst>
+              <a:ext uri="{28A0092B-C50C-407E-A947-70E740481C1C}">
+                <a14:useLocalDpi xmlns:a14="http://schemas.microsoft.com/office/drawing/2010/main" val="0"/>
+              </a:ext>
+            </a:extLst>
+          </a:blip>
+          <a:srcRect/>
+          <a:stretch>
+            <a:fillRect/>
+          </a:stretch>
+        </p:blipFill>
+        <p:spPr bwMode="auto">
+          <a:xfrm>
+            <a:off x="2514600" y="434632"/>
+            <a:ext cx="700430" cy="700430"/>
+          </a:xfrm>
+          <a:prstGeom prst="rect">
+            <a:avLst/>
+          </a:prstGeom>
+          <a:noFill/>
+          <a:extLst>
+            <a:ext uri="{909E8E84-426E-40DD-AFC4-6F175D3DCCD1}">
+              <a14:hiddenFill xmlns:a14="http://schemas.microsoft.com/office/drawing/2010/main">
+                <a:solidFill>
+                  <a:srgbClr val="FFFFFF"/>
+                </a:solidFill>
+              </a14:hiddenFill>
+            </a:ext>
+          </a:extLst>
+        </p:spPr>
+      </p:pic>
+      <p:grpSp>
+        <p:nvGrpSpPr>
+          <p:cNvPr id="5" name="Group 4"/>
+          <p:cNvGrpSpPr/>
+          <p:nvPr/>
+        </p:nvGrpSpPr>
+        <p:grpSpPr>
+          <a:xfrm>
+            <a:off x="1733" y="1150595"/>
+            <a:ext cx="3960667" cy="419100"/>
+            <a:chOff x="1733" y="1150595"/>
+            <a:chExt cx="3960667" cy="419100"/>
+          </a:xfrm>
+        </p:grpSpPr>
+        <p:sp>
+          <p:nvSpPr>
+            <p:cNvPr id="6" name="Pentagon 5"/>
+            <p:cNvSpPr/>
+            <p:nvPr/>
+          </p:nvSpPr>
+          <p:spPr>
+            <a:xfrm>
+              <a:off x="1733" y="1150595"/>
+              <a:ext cx="3960667" cy="419100"/>
+            </a:xfrm>
+            <a:prstGeom prst="homePlate">
+              <a:avLst/>
+            </a:prstGeom>
+            <a:solidFill>
+              <a:srgbClr val="505050"/>
+            </a:solidFill>
+            <a:ln>
+              <a:solidFill>
+                <a:srgbClr val="505050"/>
+              </a:solidFill>
+            </a:ln>
+          </p:spPr>
+          <p:style>
+            <a:lnRef idx="2">
+              <a:schemeClr val="accent1">
+                <a:shade val="50000"/>
+              </a:schemeClr>
+            </a:lnRef>
+            <a:fillRef idx="1">
+              <a:schemeClr val="accent1"/>
+            </a:fillRef>
+            <a:effectRef idx="0">
+              <a:schemeClr val="accent1"/>
+            </a:effectRef>
+            <a:fontRef idx="minor">
+              <a:schemeClr val="lt1"/>
+            </a:fontRef>
+          </p:style>
+          <p:txBody>
+            <a:bodyPr rtlCol="0" anchor="ctr"/>
+            <a:lstStyle/>
+            <a:p>
+              <a:pPr algn="ctr"/>
+              <a:endParaRPr lang="en-US"/>
+            </a:p>
+          </p:txBody>
+        </p:sp>
+        <p:sp>
+          <p:nvSpPr>
+            <p:cNvPr id="7" name="TextBox 6"/>
+            <p:cNvSpPr txBox="1"/>
+            <p:nvPr/>
+          </p:nvSpPr>
+          <p:spPr>
+            <a:xfrm>
+              <a:off x="153916" y="1160090"/>
+              <a:ext cx="3503684" cy="400110"/>
+            </a:xfrm>
+            <a:prstGeom prst="rect">
+              <a:avLst/>
+            </a:prstGeom>
+            <a:noFill/>
+          </p:spPr>
+          <p:txBody>
+            <a:bodyPr wrap="square" rtlCol="0">
+              <a:spAutoFit/>
+            </a:bodyPr>
+            <a:lstStyle/>
+            <a:p>
+              <a:r>
+                <a:rPr lang="en-US" sz="2000" dirty="0" smtClean="0">
+                  <a:solidFill>
+                    <a:schemeClr val="bg1"/>
+                  </a:solidFill>
+                </a:rPr>
+                <a:t>Market </a:t>
+              </a:r>
+              <a:r>
+                <a:rPr lang="en-US" sz="2000" dirty="0" smtClean="0">
+                  <a:solidFill>
+                    <a:schemeClr val="bg1"/>
+                  </a:solidFill>
+                </a:rPr>
+                <a:t>Size – Porter 5 Forces</a:t>
+              </a:r>
+              <a:endParaRPr lang="en-US" sz="2000" dirty="0">
+                <a:solidFill>
+                  <a:schemeClr val="bg1"/>
+                </a:solidFill>
+              </a:endParaRPr>
+            </a:p>
+          </p:txBody>
+        </p:sp>
+      </p:grpSp>
+      <p:sp>
+        <p:nvSpPr>
+          <p:cNvPr id="9" name="Flowchart: Alternate Process 8"/>
+          <p:cNvSpPr/>
+          <p:nvPr/>
+        </p:nvSpPr>
+        <p:spPr>
+          <a:xfrm>
+            <a:off x="1138960" y="1885950"/>
+            <a:ext cx="2823440" cy="1177240"/>
+          </a:xfrm>
+          <a:prstGeom prst="flowChartAlternateProcess">
+            <a:avLst/>
+          </a:prstGeom>
+          <a:solidFill>
+            <a:srgbClr val="129793"/>
+          </a:solidFill>
+          <a:ln>
+            <a:noFill/>
+          </a:ln>
+        </p:spPr>
+        <p:style>
+          <a:lnRef idx="2">
+            <a:schemeClr val="accent1">
+              <a:shade val="50000"/>
+            </a:schemeClr>
+          </a:lnRef>
+          <a:fillRef idx="1">
+            <a:schemeClr val="accent1"/>
+          </a:fillRef>
+          <a:effectRef idx="0">
+            <a:schemeClr val="accent1"/>
+          </a:effectRef>
+          <a:fontRef idx="minor">
+            <a:schemeClr val="lt1"/>
+          </a:fontRef>
+        </p:style>
+        <p:txBody>
+          <a:bodyPr rtlCol="0" anchor="ctr"/>
+          <a:lstStyle/>
+          <a:p>
+            <a:pPr algn="ctr"/>
+            <a:r>
+              <a:rPr lang="en-US" sz="1200" b="1" dirty="0" smtClean="0"/>
+              <a:t>Buyer Power:</a:t>
+            </a:r>
+          </a:p>
+          <a:p>
+            <a:pPr marL="285750" indent="-285750">
+              <a:buFont typeface="Wingdings" panose="05000000000000000000" pitchFamily="2" charset="2"/>
+              <a:buChar char="§"/>
+            </a:pPr>
+            <a:r>
+              <a:rPr lang="en-US" sz="1200" dirty="0" smtClean="0"/>
+              <a:t>Flexible from bulk to retail size</a:t>
+            </a:r>
+          </a:p>
+          <a:p>
+            <a:pPr marL="285750" indent="-285750">
+              <a:buFont typeface="Wingdings" panose="05000000000000000000" pitchFamily="2" charset="2"/>
+              <a:buChar char="§"/>
+            </a:pPr>
+            <a:r>
+              <a:rPr lang="en-US" sz="1200" dirty="0" smtClean="0"/>
+              <a:t>Web store as primary channel</a:t>
+            </a:r>
+          </a:p>
+          <a:p>
+            <a:pPr marL="285750" indent="-285750">
+              <a:buFont typeface="Wingdings" panose="05000000000000000000" pitchFamily="2" charset="2"/>
+              <a:buChar char="§"/>
+            </a:pPr>
+            <a:r>
+              <a:rPr lang="en-US" sz="1200" dirty="0" smtClean="0"/>
+              <a:t>Buyer aren’t sensitive to price</a:t>
+            </a:r>
+          </a:p>
+          <a:p>
+            <a:pPr marL="285750" indent="-285750">
+              <a:buFont typeface="Wingdings" panose="05000000000000000000" pitchFamily="2" charset="2"/>
+              <a:buChar char="§"/>
+            </a:pPr>
+            <a:r>
+              <a:rPr lang="en-US" sz="1200" dirty="0" smtClean="0"/>
+              <a:t>Low customer loyalty</a:t>
+            </a:r>
+          </a:p>
+        </p:txBody>
+      </p:sp>
+      <p:sp>
+        <p:nvSpPr>
+          <p:cNvPr id="10" name="Flowchart: Alternate Process 9"/>
+          <p:cNvSpPr/>
+          <p:nvPr/>
+        </p:nvSpPr>
+        <p:spPr>
+          <a:xfrm>
+            <a:off x="952879" y="3524250"/>
+            <a:ext cx="2704721" cy="1219200"/>
+          </a:xfrm>
+          <a:prstGeom prst="flowChartAlternateProcess">
+            <a:avLst/>
+          </a:prstGeom>
+          <a:solidFill>
+            <a:srgbClr val="129793"/>
+          </a:solidFill>
+          <a:ln>
+            <a:noFill/>
+          </a:ln>
+        </p:spPr>
+        <p:style>
+          <a:lnRef idx="2">
+            <a:schemeClr val="accent1">
+              <a:shade val="50000"/>
+            </a:schemeClr>
+          </a:lnRef>
+          <a:fillRef idx="1">
+            <a:schemeClr val="accent1"/>
+          </a:fillRef>
+          <a:effectRef idx="0">
+            <a:schemeClr val="accent1"/>
+          </a:effectRef>
+          <a:fontRef idx="minor">
+            <a:schemeClr val="lt1"/>
+          </a:fontRef>
+        </p:style>
+        <p:txBody>
+          <a:bodyPr rtlCol="0" anchor="ctr"/>
+          <a:lstStyle/>
+          <a:p>
+            <a:pPr algn="ctr"/>
+            <a:r>
+              <a:rPr lang="en-US" sz="1200" b="1" dirty="0" smtClean="0"/>
+              <a:t>Supplier Power:</a:t>
+            </a:r>
+          </a:p>
+          <a:p>
+            <a:pPr marL="285750" indent="-285750">
+              <a:buFont typeface="Wingdings" panose="05000000000000000000" pitchFamily="2" charset="2"/>
+              <a:buChar char="§"/>
+            </a:pPr>
+            <a:r>
+              <a:rPr lang="en-US" sz="1200" dirty="0" smtClean="0"/>
+              <a:t>Less than 50 suppliers worldwide</a:t>
+            </a:r>
+          </a:p>
+          <a:p>
+            <a:pPr marL="285750" indent="-285750">
+              <a:buFont typeface="Wingdings" panose="05000000000000000000" pitchFamily="2" charset="2"/>
+              <a:buChar char="§"/>
+            </a:pPr>
+            <a:r>
+              <a:rPr lang="en-US" sz="1200" dirty="0" smtClean="0"/>
+              <a:t>Small to medium size of company</a:t>
+            </a:r>
+          </a:p>
+          <a:p>
+            <a:pPr marL="285750" indent="-285750">
+              <a:buFont typeface="Wingdings" panose="05000000000000000000" pitchFamily="2" charset="2"/>
+              <a:buChar char="§"/>
+            </a:pPr>
+            <a:r>
+              <a:rPr lang="en-US" sz="1200" dirty="0" smtClean="0"/>
+              <a:t>There are some similar substitute product</a:t>
+            </a:r>
+          </a:p>
+        </p:txBody>
+      </p:sp>
+      <p:sp>
+        <p:nvSpPr>
+          <p:cNvPr id="11" name="Flowchart: Alternate Process 10"/>
+          <p:cNvSpPr/>
+          <p:nvPr/>
+        </p:nvSpPr>
+        <p:spPr>
+          <a:xfrm>
+            <a:off x="3514725" y="2571750"/>
+            <a:ext cx="1981200" cy="1219200"/>
+          </a:xfrm>
+          <a:prstGeom prst="flowChartAlternateProcess">
+            <a:avLst/>
+          </a:prstGeom>
+          <a:solidFill>
+            <a:srgbClr val="FF7260"/>
+          </a:solidFill>
+          <a:ln>
+            <a:noFill/>
+          </a:ln>
+        </p:spPr>
+        <p:style>
+          <a:lnRef idx="2">
+            <a:schemeClr val="accent1">
+              <a:shade val="50000"/>
+            </a:schemeClr>
+          </a:lnRef>
+          <a:fillRef idx="1">
+            <a:schemeClr val="accent1"/>
+          </a:fillRef>
+          <a:effectRef idx="0">
+            <a:schemeClr val="accent1"/>
+          </a:effectRef>
+          <a:fontRef idx="minor">
+            <a:schemeClr val="lt1"/>
+          </a:fontRef>
+        </p:style>
+        <p:txBody>
+          <a:bodyPr rtlCol="0" anchor="ctr"/>
+          <a:lstStyle/>
+          <a:p>
+            <a:pPr algn="ctr"/>
+            <a:r>
+              <a:rPr lang="en-US" sz="1200" b="1" dirty="0" smtClean="0"/>
+              <a:t>Competitive Rivalry:</a:t>
+            </a:r>
+          </a:p>
+          <a:p>
+            <a:pPr marL="285750" indent="-285750">
+              <a:buFont typeface="Wingdings" panose="05000000000000000000" pitchFamily="2" charset="2"/>
+              <a:buChar char="§"/>
+            </a:pPr>
+            <a:r>
+              <a:rPr lang="en-US" sz="1200" dirty="0" smtClean="0"/>
+              <a:t>Few competitor</a:t>
+            </a:r>
+          </a:p>
+          <a:p>
+            <a:pPr marL="285750" indent="-285750">
+              <a:buFont typeface="Wingdings" panose="05000000000000000000" pitchFamily="2" charset="2"/>
+              <a:buChar char="§"/>
+            </a:pPr>
+            <a:r>
+              <a:rPr lang="en-US" sz="1200" dirty="0" smtClean="0"/>
+              <a:t>Innovative product</a:t>
+            </a:r>
+          </a:p>
+          <a:p>
+            <a:pPr marL="285750" indent="-285750">
+              <a:buFont typeface="Wingdings" panose="05000000000000000000" pitchFamily="2" charset="2"/>
+              <a:buChar char="§"/>
+            </a:pPr>
+            <a:r>
+              <a:rPr lang="en-US" sz="1200" dirty="0" smtClean="0"/>
+              <a:t>Small target market</a:t>
+            </a:r>
+          </a:p>
+          <a:p>
+            <a:pPr marL="285750" indent="-285750">
+              <a:buFont typeface="Wingdings" panose="05000000000000000000" pitchFamily="2" charset="2"/>
+              <a:buChar char="§"/>
+            </a:pPr>
+            <a:r>
+              <a:rPr lang="en-US" sz="1200" dirty="0" smtClean="0"/>
+              <a:t>Unique product</a:t>
+            </a:r>
+          </a:p>
+        </p:txBody>
+      </p:sp>
+    </p:spTree>
+    <p:extLst>
+      <p:ext uri="{BB962C8B-B14F-4D97-AF65-F5344CB8AC3E}">
+        <p14:creationId xmlns:p14="http://schemas.microsoft.com/office/powerpoint/2010/main" val="140416733"/>
+      </p:ext>
+    </p:extLst>
+  </p:cSld>
+  <p:clrMapOvr>
+    <a:masterClrMapping/>
+  </p:clrMapOvr>
+</p:sld>
+</file>
+
+<file path=ppt/slides/slide11.xml><?xml version="1.0" encoding="utf-8"?>
+<p:sld xmlns:a="http://schemas.openxmlformats.org/drawingml/2006/main" xmlns:r="http://schemas.openxmlformats.org/officeDocument/2006/relationships" xmlns:p="http://schemas.openxmlformats.org/presentationml/2006/main">
+  <p:cSld>
+    <p:spTree>
+      <p:nvGrpSpPr>
+        <p:cNvPr id="1" name=""/>
+        <p:cNvGrpSpPr/>
+        <p:nvPr/>
+      </p:nvGrpSpPr>
+      <p:grpSpPr>
+        <a:xfrm>
+          <a:off x="0" y="0"/>
+          <a:ext cx="0" cy="0"/>
+          <a:chOff x="0" y="0"/>
+          <a:chExt cx="0" cy="0"/>
+        </a:xfrm>
+      </p:grpSpPr>
+      <p:sp>
+        <p:nvSpPr>
           <p:cNvPr id="2" name="Title 1"/>
           <p:cNvSpPr txBox="1">
             <a:spLocks/>
@@ -8542,7 +10152,7 @@
 </p:sld>
 </file>
 
-<file path=ppt/slides/slide11.xml><?xml version="1.0" encoding="utf-8"?>
+<file path=ppt/slides/slide12.xml><?xml version="1.0" encoding="utf-8"?>
 <p:sld xmlns:a="http://schemas.openxmlformats.org/drawingml/2006/main" xmlns:r="http://schemas.openxmlformats.org/officeDocument/2006/relationships" xmlns:p="http://schemas.openxmlformats.org/presentationml/2006/main">
   <p:cSld>
     <p:spTree>
@@ -8925,8 +10535,8 @@
               <a:gd name="adj2" fmla="val 106839"/>
               <a:gd name="adj3" fmla="val -29951"/>
               <a:gd name="adj4" fmla="val 122035"/>
-              <a:gd name="adj5" fmla="val -179850"/>
-              <a:gd name="adj6" fmla="val 112228"/>
+              <a:gd name="adj5" fmla="val -185338"/>
+              <a:gd name="adj6" fmla="val 109902"/>
             </a:avLst>
           </a:prstGeom>
           <a:noFill/>
@@ -9248,8 +10858,779 @@
         </p:nvSpPr>
         <p:spPr>
           <a:xfrm>
-            <a:off x="6477000" y="4705350"/>
-            <a:ext cx="2590799" cy="303573"/>
+            <a:off x="6401793" y="4552950"/>
+            <a:ext cx="2666007" cy="455973"/>
+          </a:xfrm>
+          <a:prstGeom prst="rect">
+            <a:avLst/>
+          </a:prstGeom>
+        </p:spPr>
+        <p:txBody>
+          <a:bodyPr vert="horz" lIns="91440" tIns="45720" rIns="91440" bIns="45720" rtlCol="0" anchor="ctr">
+            <a:noAutofit/>
+          </a:bodyPr>
+          <a:lstStyle>
+            <a:lvl1pPr algn="ctr" defTabSz="914400" rtl="0" eaLnBrk="1" latinLnBrk="0" hangingPunct="1">
+              <a:spcBef>
+                <a:spcPct val="0"/>
+              </a:spcBef>
+              <a:buNone/>
+              <a:defRPr sz="4400" kern="1200">
+                <a:solidFill>
+                  <a:schemeClr val="tx1"/>
+                </a:solidFill>
+                <a:latin typeface="+mj-lt"/>
+                <a:ea typeface="+mj-ea"/>
+                <a:cs typeface="+mj-cs"/>
+              </a:defRPr>
+            </a:lvl1pPr>
+          </a:lstStyle>
+          <a:p>
+            <a:pPr algn="r"/>
+            <a:r>
+              <a:rPr lang="en-US" sz="1100" dirty="0" smtClean="0">
+                <a:solidFill>
+                  <a:srgbClr val="505050"/>
+                </a:solidFill>
+              </a:rPr>
+              <a:t>Source: </a:t>
+            </a:r>
+            <a:r>
+              <a:rPr lang="en-US" sz="1100" dirty="0" err="1" smtClean="0">
+                <a:solidFill>
+                  <a:srgbClr val="505050"/>
+                </a:solidFill>
+              </a:rPr>
+              <a:t>Rumpold</a:t>
+            </a:r>
+            <a:r>
+              <a:rPr lang="en-US" sz="1100" dirty="0" smtClean="0">
+                <a:solidFill>
+                  <a:srgbClr val="505050"/>
+                </a:solidFill>
+              </a:rPr>
+              <a:t>, </a:t>
+            </a:r>
+            <a:r>
+              <a:rPr lang="en-US" sz="1100" dirty="0" err="1" smtClean="0">
+                <a:solidFill>
+                  <a:srgbClr val="505050"/>
+                </a:solidFill>
+              </a:rPr>
+              <a:t>Schluter</a:t>
+            </a:r>
+            <a:r>
+              <a:rPr lang="en-US" sz="1100" dirty="0" smtClean="0">
+                <a:solidFill>
+                  <a:srgbClr val="505050"/>
+                </a:solidFill>
+              </a:rPr>
+              <a:t>, </a:t>
+            </a:r>
+            <a:r>
+              <a:rPr lang="en-US" sz="1100" dirty="0" smtClean="0">
+                <a:solidFill>
+                  <a:srgbClr val="505050"/>
+                </a:solidFill>
+              </a:rPr>
+              <a:t>2012</a:t>
+            </a:r>
+          </a:p>
+          <a:p>
+            <a:pPr algn="r"/>
+            <a:r>
+              <a:rPr lang="en-US" sz="1100" dirty="0" smtClean="0">
+                <a:solidFill>
+                  <a:srgbClr val="505050"/>
+                </a:solidFill>
+              </a:rPr>
+              <a:t>FAO, 2013</a:t>
+            </a:r>
+            <a:endParaRPr lang="en-US" sz="1100" dirty="0">
+              <a:solidFill>
+                <a:srgbClr val="505050"/>
+              </a:solidFill>
+            </a:endParaRPr>
+          </a:p>
+        </p:txBody>
+      </p:sp>
+    </p:spTree>
+    <p:extLst>
+      <p:ext uri="{BB962C8B-B14F-4D97-AF65-F5344CB8AC3E}">
+        <p14:creationId xmlns:p14="http://schemas.microsoft.com/office/powerpoint/2010/main" val="2685669578"/>
+      </p:ext>
+    </p:extLst>
+  </p:cSld>
+  <p:clrMapOvr>
+    <a:masterClrMapping/>
+  </p:clrMapOvr>
+  <p:timing>
+    <p:tnLst>
+      <p:par>
+        <p:cTn id="1" dur="indefinite" restart="never" nodeType="tmRoot"/>
+      </p:par>
+    </p:tnLst>
+  </p:timing>
+</p:sld>
+</file>
+
+<file path=ppt/slides/slide13.xml><?xml version="1.0" encoding="utf-8"?>
+<p:sld xmlns:a="http://schemas.openxmlformats.org/drawingml/2006/main" xmlns:r="http://schemas.openxmlformats.org/officeDocument/2006/relationships" xmlns:p="http://schemas.openxmlformats.org/presentationml/2006/main">
+  <p:cSld>
+    <p:spTree>
+      <p:nvGrpSpPr>
+        <p:cNvPr id="1" name=""/>
+        <p:cNvGrpSpPr/>
+        <p:nvPr/>
+      </p:nvGrpSpPr>
+      <p:grpSpPr>
+        <a:xfrm>
+          <a:off x="0" y="0"/>
+          <a:ext cx="0" cy="0"/>
+          <a:chOff x="0" y="0"/>
+          <a:chExt cx="0" cy="0"/>
+        </a:xfrm>
+      </p:grpSpPr>
+      <p:sp>
+        <p:nvSpPr>
+          <p:cNvPr id="2" name="Title 1"/>
+          <p:cNvSpPr txBox="1">
+            <a:spLocks/>
+          </p:cNvSpPr>
+          <p:nvPr/>
+        </p:nvSpPr>
+        <p:spPr>
+          <a:xfrm>
+            <a:off x="457200" y="228600"/>
+            <a:ext cx="8229600" cy="1143000"/>
+          </a:xfrm>
+          <a:prstGeom prst="rect">
+            <a:avLst/>
+          </a:prstGeom>
+        </p:spPr>
+        <p:txBody>
+          <a:bodyPr vert="horz" lIns="91440" tIns="45720" rIns="91440" bIns="45720" rtlCol="0" anchor="ctr">
+            <a:normAutofit/>
+          </a:bodyPr>
+          <a:lstStyle>
+            <a:lvl1pPr algn="ctr" defTabSz="914400" rtl="0" eaLnBrk="1" latinLnBrk="0" hangingPunct="1">
+              <a:spcBef>
+                <a:spcPct val="0"/>
+              </a:spcBef>
+              <a:buNone/>
+              <a:defRPr sz="4400" kern="1200">
+                <a:solidFill>
+                  <a:schemeClr val="tx1"/>
+                </a:solidFill>
+                <a:latin typeface="+mj-lt"/>
+                <a:ea typeface="+mj-ea"/>
+                <a:cs typeface="+mj-cs"/>
+              </a:defRPr>
+            </a:lvl1pPr>
+          </a:lstStyle>
+          <a:p>
+            <a:pPr algn="l"/>
+            <a:r>
+              <a:rPr lang="en-US" dirty="0" smtClean="0">
+                <a:solidFill>
+                  <a:srgbClr val="129793"/>
+                </a:solidFill>
+              </a:rPr>
+              <a:t>Content</a:t>
+            </a:r>
+            <a:endParaRPr lang="en-US" dirty="0">
+              <a:solidFill>
+                <a:srgbClr val="129793"/>
+              </a:solidFill>
+            </a:endParaRPr>
+          </a:p>
+        </p:txBody>
+      </p:sp>
+      <p:sp>
+        <p:nvSpPr>
+          <p:cNvPr id="3" name="Right Triangle 2"/>
+          <p:cNvSpPr/>
+          <p:nvPr/>
+        </p:nvSpPr>
+        <p:spPr>
+          <a:xfrm rot="10800000">
+            <a:off x="6096000" y="0"/>
+            <a:ext cx="3048000" cy="1569694"/>
+          </a:xfrm>
+          <a:prstGeom prst="rtTriangle">
+            <a:avLst/>
+          </a:prstGeom>
+          <a:solidFill>
+            <a:srgbClr val="9BD7D5"/>
+          </a:solidFill>
+          <a:ln>
+            <a:solidFill>
+              <a:srgbClr val="9BD7D5"/>
+            </a:solidFill>
+          </a:ln>
+        </p:spPr>
+        <p:style>
+          <a:lnRef idx="2">
+            <a:schemeClr val="accent1">
+              <a:shade val="50000"/>
+            </a:schemeClr>
+          </a:lnRef>
+          <a:fillRef idx="1">
+            <a:schemeClr val="accent1"/>
+          </a:fillRef>
+          <a:effectRef idx="0">
+            <a:schemeClr val="accent1"/>
+          </a:effectRef>
+          <a:fontRef idx="minor">
+            <a:schemeClr val="lt1"/>
+          </a:fontRef>
+        </p:style>
+        <p:txBody>
+          <a:bodyPr rtlCol="0" anchor="ctr"/>
+          <a:lstStyle/>
+          <a:p>
+            <a:pPr algn="ctr"/>
+            <a:endParaRPr lang="en-US"/>
+          </a:p>
+        </p:txBody>
+      </p:sp>
+      <p:grpSp>
+        <p:nvGrpSpPr>
+          <p:cNvPr id="4" name="Group 3"/>
+          <p:cNvGrpSpPr/>
+          <p:nvPr/>
+        </p:nvGrpSpPr>
+        <p:grpSpPr>
+          <a:xfrm>
+            <a:off x="1733" y="1150595"/>
+            <a:ext cx="3960667" cy="419100"/>
+            <a:chOff x="1733" y="1150595"/>
+            <a:chExt cx="3960667" cy="419100"/>
+          </a:xfrm>
+        </p:grpSpPr>
+        <p:sp>
+          <p:nvSpPr>
+            <p:cNvPr id="5" name="Pentagon 4"/>
+            <p:cNvSpPr/>
+            <p:nvPr/>
+          </p:nvSpPr>
+          <p:spPr>
+            <a:xfrm>
+              <a:off x="1733" y="1150595"/>
+              <a:ext cx="3960667" cy="419100"/>
+            </a:xfrm>
+            <a:prstGeom prst="homePlate">
+              <a:avLst/>
+            </a:prstGeom>
+            <a:solidFill>
+              <a:srgbClr val="505050"/>
+            </a:solidFill>
+            <a:ln>
+              <a:solidFill>
+                <a:srgbClr val="505050"/>
+              </a:solidFill>
+            </a:ln>
+          </p:spPr>
+          <p:style>
+            <a:lnRef idx="2">
+              <a:schemeClr val="accent1">
+                <a:shade val="50000"/>
+              </a:schemeClr>
+            </a:lnRef>
+            <a:fillRef idx="1">
+              <a:schemeClr val="accent1"/>
+            </a:fillRef>
+            <a:effectRef idx="0">
+              <a:schemeClr val="accent1"/>
+            </a:effectRef>
+            <a:fontRef idx="minor">
+              <a:schemeClr val="lt1"/>
+            </a:fontRef>
+          </p:style>
+          <p:txBody>
+            <a:bodyPr rtlCol="0" anchor="ctr"/>
+            <a:lstStyle/>
+            <a:p>
+              <a:pPr algn="ctr"/>
+              <a:endParaRPr lang="en-US"/>
+            </a:p>
+          </p:txBody>
+        </p:sp>
+        <p:sp>
+          <p:nvSpPr>
+            <p:cNvPr id="6" name="TextBox 5"/>
+            <p:cNvSpPr txBox="1"/>
+            <p:nvPr/>
+          </p:nvSpPr>
+          <p:spPr>
+            <a:xfrm>
+              <a:off x="153916" y="1160090"/>
+              <a:ext cx="2803596" cy="400110"/>
+            </a:xfrm>
+            <a:prstGeom prst="rect">
+              <a:avLst/>
+            </a:prstGeom>
+            <a:noFill/>
+          </p:spPr>
+          <p:txBody>
+            <a:bodyPr wrap="square" rtlCol="0">
+              <a:spAutoFit/>
+            </a:bodyPr>
+            <a:lstStyle/>
+            <a:p>
+              <a:r>
+                <a:rPr lang="en-US" sz="2000" dirty="0" smtClean="0">
+                  <a:solidFill>
+                    <a:schemeClr val="bg1"/>
+                  </a:solidFill>
+                </a:rPr>
+                <a:t>Norm – Nutritional Value</a:t>
+              </a:r>
+              <a:endParaRPr lang="en-US" sz="2000" dirty="0">
+                <a:solidFill>
+                  <a:schemeClr val="bg1"/>
+                </a:solidFill>
+              </a:endParaRPr>
+            </a:p>
+          </p:txBody>
+        </p:sp>
+      </p:grpSp>
+      <p:pic>
+        <p:nvPicPr>
+          <p:cNvPr id="7" name="Picture 5" descr="C:\Users\Melinda Tjia\Desktop\dll\png\basic.png"/>
+          <p:cNvPicPr>
+            <a:picLocks noChangeAspect="1" noChangeArrowheads="1"/>
+          </p:cNvPicPr>
+          <p:nvPr/>
+        </p:nvPicPr>
+        <p:blipFill>
+          <a:blip r:embed="rId2" cstate="print">
+            <a:biLevel thresh="25000"/>
+            <a:extLst>
+              <a:ext uri="{28A0092B-C50C-407E-A947-70E740481C1C}">
+                <a14:useLocalDpi xmlns:a14="http://schemas.microsoft.com/office/drawing/2010/main" val="0"/>
+              </a:ext>
+            </a:extLst>
+          </a:blip>
+          <a:srcRect/>
+          <a:stretch>
+            <a:fillRect/>
+          </a:stretch>
+        </p:blipFill>
+        <p:spPr bwMode="auto">
+          <a:xfrm>
+            <a:off x="2514600" y="434632"/>
+            <a:ext cx="700430" cy="700430"/>
+          </a:xfrm>
+          <a:prstGeom prst="rect">
+            <a:avLst/>
+          </a:prstGeom>
+          <a:noFill/>
+          <a:extLst>
+            <a:ext uri="{909E8E84-426E-40DD-AFC4-6F175D3DCCD1}">
+              <a14:hiddenFill xmlns:a14="http://schemas.microsoft.com/office/drawing/2010/main">
+                <a:solidFill>
+                  <a:srgbClr val="FFFFFF"/>
+                </a:solidFill>
+              </a14:hiddenFill>
+            </a:ext>
+          </a:extLst>
+        </p:spPr>
+      </p:pic>
+      <p:graphicFrame>
+        <p:nvGraphicFramePr>
+          <p:cNvPr id="12" name="Chart 11"/>
+          <p:cNvGraphicFramePr>
+            <a:graphicFrameLocks/>
+          </p:cNvGraphicFramePr>
+          <p:nvPr>
+            <p:extLst>
+              <p:ext uri="{D42A27DB-BD31-4B8C-83A1-F6EECF244321}">
+                <p14:modId xmlns:p14="http://schemas.microsoft.com/office/powerpoint/2010/main" val="2351946665"/>
+              </p:ext>
+            </p:extLst>
+          </p:nvPr>
+        </p:nvGraphicFramePr>
+        <p:xfrm>
+          <a:off x="6090550" y="2097320"/>
+          <a:ext cx="2809875" cy="2590800"/>
+        </p:xfrm>
+        <a:graphic>
+          <a:graphicData uri="http://schemas.openxmlformats.org/drawingml/2006/chart">
+            <c:chart xmlns:c="http://schemas.openxmlformats.org/drawingml/2006/chart" xmlns:r="http://schemas.openxmlformats.org/officeDocument/2006/relationships" r:id="rId3"/>
+          </a:graphicData>
+        </a:graphic>
+      </p:graphicFrame>
+      <p:sp>
+        <p:nvSpPr>
+          <p:cNvPr id="13" name="TextBox 12"/>
+          <p:cNvSpPr txBox="1"/>
+          <p:nvPr/>
+        </p:nvSpPr>
+        <p:spPr>
+          <a:xfrm>
+            <a:off x="838200" y="1699796"/>
+            <a:ext cx="7467600" cy="369332"/>
+          </a:xfrm>
+          <a:prstGeom prst="rect">
+            <a:avLst/>
+          </a:prstGeom>
+          <a:noFill/>
+        </p:spPr>
+        <p:txBody>
+          <a:bodyPr wrap="square" rtlCol="0">
+            <a:spAutoFit/>
+          </a:bodyPr>
+          <a:lstStyle/>
+          <a:p>
+            <a:pPr algn="ctr"/>
+            <a:r>
+              <a:rPr lang="en-US" dirty="0" smtClean="0">
+                <a:solidFill>
+                  <a:srgbClr val="129793"/>
+                </a:solidFill>
+              </a:rPr>
+              <a:t>Ratio of nutrition content with daily recommended value</a:t>
+            </a:r>
+            <a:endParaRPr lang="en-US" dirty="0">
+              <a:solidFill>
+                <a:srgbClr val="129793"/>
+              </a:solidFill>
+            </a:endParaRPr>
+          </a:p>
+        </p:txBody>
+      </p:sp>
+      <p:graphicFrame>
+        <p:nvGraphicFramePr>
+          <p:cNvPr id="14" name="Chart 13"/>
+          <p:cNvGraphicFramePr>
+            <a:graphicFrameLocks/>
+          </p:cNvGraphicFramePr>
+          <p:nvPr>
+            <p:extLst>
+              <p:ext uri="{D42A27DB-BD31-4B8C-83A1-F6EECF244321}">
+                <p14:modId xmlns:p14="http://schemas.microsoft.com/office/powerpoint/2010/main" val="2061048737"/>
+              </p:ext>
+            </p:extLst>
+          </p:nvPr>
+        </p:nvGraphicFramePr>
+        <p:xfrm>
+          <a:off x="3138830" y="2163693"/>
+          <a:ext cx="2809875" cy="2590800"/>
+        </p:xfrm>
+        <a:graphic>
+          <a:graphicData uri="http://schemas.openxmlformats.org/drawingml/2006/chart">
+            <c:chart xmlns:c="http://schemas.openxmlformats.org/drawingml/2006/chart" xmlns:r="http://schemas.openxmlformats.org/officeDocument/2006/relationships" r:id="rId4"/>
+          </a:graphicData>
+        </a:graphic>
+      </p:graphicFrame>
+      <p:graphicFrame>
+        <p:nvGraphicFramePr>
+          <p:cNvPr id="15" name="Chart 14"/>
+          <p:cNvGraphicFramePr>
+            <a:graphicFrameLocks/>
+          </p:cNvGraphicFramePr>
+          <p:nvPr>
+            <p:extLst>
+              <p:ext uri="{D42A27DB-BD31-4B8C-83A1-F6EECF244321}">
+                <p14:modId xmlns:p14="http://schemas.microsoft.com/office/powerpoint/2010/main" val="4077566189"/>
+              </p:ext>
+            </p:extLst>
+          </p:nvPr>
+        </p:nvGraphicFramePr>
+        <p:xfrm>
+          <a:off x="228600" y="2114550"/>
+          <a:ext cx="2819400" cy="2590800"/>
+        </p:xfrm>
+        <a:graphic>
+          <a:graphicData uri="http://schemas.openxmlformats.org/drawingml/2006/chart">
+            <c:chart xmlns:c="http://schemas.openxmlformats.org/drawingml/2006/chart" xmlns:r="http://schemas.openxmlformats.org/officeDocument/2006/relationships" r:id="rId5"/>
+          </a:graphicData>
+        </a:graphic>
+      </p:graphicFrame>
+      <p:sp>
+        <p:nvSpPr>
+          <p:cNvPr id="16" name="TextBox 12"/>
+          <p:cNvSpPr txBox="1"/>
+          <p:nvPr/>
+        </p:nvSpPr>
+        <p:spPr>
+          <a:xfrm>
+            <a:off x="762000" y="3114726"/>
+            <a:ext cx="1806503" cy="461665"/>
+          </a:xfrm>
+          <a:prstGeom prst="rect">
+            <a:avLst/>
+          </a:prstGeom>
+          <a:noFill/>
+        </p:spPr>
+        <p:txBody>
+          <a:bodyPr wrap="square" rtlCol="0">
+            <a:spAutoFit/>
+          </a:bodyPr>
+          <a:lstStyle>
+            <a:lvl1pPr marL="0" indent="0">
+              <a:defRPr sz="1100">
+                <a:latin typeface="+mn-lt"/>
+                <a:ea typeface="+mn-ea"/>
+                <a:cs typeface="+mn-cs"/>
+              </a:defRPr>
+            </a:lvl1pPr>
+            <a:lvl2pPr marL="457200" indent="0">
+              <a:defRPr sz="1100">
+                <a:latin typeface="+mn-lt"/>
+                <a:ea typeface="+mn-ea"/>
+                <a:cs typeface="+mn-cs"/>
+              </a:defRPr>
+            </a:lvl2pPr>
+            <a:lvl3pPr marL="914400" indent="0">
+              <a:defRPr sz="1100">
+                <a:latin typeface="+mn-lt"/>
+                <a:ea typeface="+mn-ea"/>
+                <a:cs typeface="+mn-cs"/>
+              </a:defRPr>
+            </a:lvl3pPr>
+            <a:lvl4pPr marL="1371600" indent="0">
+              <a:defRPr sz="1100">
+                <a:latin typeface="+mn-lt"/>
+                <a:ea typeface="+mn-ea"/>
+                <a:cs typeface="+mn-cs"/>
+              </a:defRPr>
+            </a:lvl4pPr>
+            <a:lvl5pPr marL="1828800" indent="0">
+              <a:defRPr sz="1100">
+                <a:latin typeface="+mn-lt"/>
+                <a:ea typeface="+mn-ea"/>
+                <a:cs typeface="+mn-cs"/>
+              </a:defRPr>
+            </a:lvl5pPr>
+            <a:lvl6pPr marL="2286000" indent="0">
+              <a:defRPr sz="1100">
+                <a:latin typeface="+mn-lt"/>
+                <a:ea typeface="+mn-ea"/>
+                <a:cs typeface="+mn-cs"/>
+              </a:defRPr>
+            </a:lvl6pPr>
+            <a:lvl7pPr marL="2743200" indent="0">
+              <a:defRPr sz="1100">
+                <a:latin typeface="+mn-lt"/>
+                <a:ea typeface="+mn-ea"/>
+                <a:cs typeface="+mn-cs"/>
+              </a:defRPr>
+            </a:lvl7pPr>
+            <a:lvl8pPr marL="3200400" indent="0">
+              <a:defRPr sz="1100">
+                <a:latin typeface="+mn-lt"/>
+                <a:ea typeface="+mn-ea"/>
+                <a:cs typeface="+mn-cs"/>
+              </a:defRPr>
+            </a:lvl8pPr>
+            <a:lvl9pPr marL="3657600" indent="0">
+              <a:defRPr sz="1100">
+                <a:latin typeface="+mn-lt"/>
+                <a:ea typeface="+mn-ea"/>
+                <a:cs typeface="+mn-cs"/>
+              </a:defRPr>
+            </a:lvl9pPr>
+          </a:lstStyle>
+          <a:p>
+            <a:pPr algn="ctr"/>
+            <a:r>
+              <a:rPr lang="en-US" sz="2400" dirty="0" smtClean="0">
+                <a:solidFill>
+                  <a:srgbClr val="129793"/>
+                </a:solidFill>
+              </a:rPr>
+              <a:t>MEALWORM</a:t>
+            </a:r>
+            <a:endParaRPr lang="en-US" sz="2400" dirty="0">
+              <a:solidFill>
+                <a:srgbClr val="129793"/>
+              </a:solidFill>
+            </a:endParaRPr>
+          </a:p>
+        </p:txBody>
+      </p:sp>
+      <p:sp>
+        <p:nvSpPr>
+          <p:cNvPr id="17" name="Rectangle 16"/>
+          <p:cNvSpPr/>
+          <p:nvPr/>
+        </p:nvSpPr>
+        <p:spPr>
+          <a:xfrm>
+            <a:off x="304800" y="4533900"/>
+            <a:ext cx="628613" cy="190500"/>
+          </a:xfrm>
+          <a:prstGeom prst="rect">
+            <a:avLst/>
+          </a:prstGeom>
+          <a:solidFill>
+            <a:srgbClr val="505050"/>
+          </a:solidFill>
+          <a:ln>
+            <a:noFill/>
+          </a:ln>
+        </p:spPr>
+        <p:style>
+          <a:lnRef idx="2">
+            <a:schemeClr val="accent1">
+              <a:shade val="50000"/>
+            </a:schemeClr>
+          </a:lnRef>
+          <a:fillRef idx="1">
+            <a:schemeClr val="accent1"/>
+          </a:fillRef>
+          <a:effectRef idx="0">
+            <a:schemeClr val="accent1"/>
+          </a:effectRef>
+          <a:fontRef idx="minor">
+            <a:schemeClr val="lt1"/>
+          </a:fontRef>
+        </p:style>
+        <p:txBody>
+          <a:bodyPr rtlCol="0" anchor="ctr"/>
+          <a:lstStyle/>
+          <a:p>
+            <a:pPr algn="ctr"/>
+            <a:endParaRPr lang="en-US"/>
+          </a:p>
+        </p:txBody>
+      </p:sp>
+      <p:sp>
+        <p:nvSpPr>
+          <p:cNvPr id="18" name="TextBox 17"/>
+          <p:cNvSpPr txBox="1"/>
+          <p:nvPr/>
+        </p:nvSpPr>
+        <p:spPr>
+          <a:xfrm>
+            <a:off x="933413" y="4451434"/>
+            <a:ext cx="3257587" cy="338554"/>
+          </a:xfrm>
+          <a:prstGeom prst="rect">
+            <a:avLst/>
+          </a:prstGeom>
+          <a:noFill/>
+        </p:spPr>
+        <p:txBody>
+          <a:bodyPr wrap="square" rtlCol="0">
+            <a:spAutoFit/>
+          </a:bodyPr>
+          <a:lstStyle/>
+          <a:p>
+            <a:r>
+              <a:rPr lang="en-US" sz="1600" dirty="0" smtClean="0">
+                <a:solidFill>
+                  <a:srgbClr val="505050"/>
+                </a:solidFill>
+              </a:rPr>
+              <a:t>Protein. Daily recommendation = 50g</a:t>
+            </a:r>
+            <a:endParaRPr lang="en-US" sz="1600" dirty="0">
+              <a:solidFill>
+                <a:srgbClr val="505050"/>
+              </a:solidFill>
+            </a:endParaRPr>
+          </a:p>
+        </p:txBody>
+      </p:sp>
+      <p:sp>
+        <p:nvSpPr>
+          <p:cNvPr id="19" name="Rectangle 18"/>
+          <p:cNvSpPr/>
+          <p:nvPr/>
+        </p:nvSpPr>
+        <p:spPr>
+          <a:xfrm>
+            <a:off x="304801" y="4762499"/>
+            <a:ext cx="628612" cy="169277"/>
+          </a:xfrm>
+          <a:prstGeom prst="rect">
+            <a:avLst/>
+          </a:prstGeom>
+          <a:solidFill>
+            <a:srgbClr val="FF7260"/>
+          </a:solidFill>
+          <a:ln>
+            <a:noFill/>
+          </a:ln>
+        </p:spPr>
+        <p:style>
+          <a:lnRef idx="2">
+            <a:schemeClr val="accent1">
+              <a:shade val="50000"/>
+            </a:schemeClr>
+          </a:lnRef>
+          <a:fillRef idx="1">
+            <a:schemeClr val="accent1"/>
+          </a:fillRef>
+          <a:effectRef idx="0">
+            <a:schemeClr val="accent1"/>
+          </a:effectRef>
+          <a:fontRef idx="minor">
+            <a:schemeClr val="lt1"/>
+          </a:fontRef>
+        </p:style>
+        <p:txBody>
+          <a:bodyPr rtlCol="0" anchor="ctr"/>
+          <a:lstStyle/>
+          <a:p>
+            <a:pPr algn="ctr"/>
+            <a:endParaRPr lang="en-US"/>
+          </a:p>
+        </p:txBody>
+      </p:sp>
+      <p:sp>
+        <p:nvSpPr>
+          <p:cNvPr id="20" name="TextBox 19"/>
+          <p:cNvSpPr txBox="1"/>
+          <p:nvPr/>
+        </p:nvSpPr>
+        <p:spPr>
+          <a:xfrm>
+            <a:off x="959679" y="4677860"/>
+            <a:ext cx="3917121" cy="338554"/>
+          </a:xfrm>
+          <a:prstGeom prst="rect">
+            <a:avLst/>
+          </a:prstGeom>
+          <a:noFill/>
+        </p:spPr>
+        <p:txBody>
+          <a:bodyPr wrap="square" rtlCol="0">
+            <a:spAutoFit/>
+          </a:bodyPr>
+          <a:lstStyle/>
+          <a:p>
+            <a:r>
+              <a:rPr lang="en-US" sz="1600" dirty="0" smtClean="0">
+                <a:solidFill>
+                  <a:srgbClr val="505050"/>
+                </a:solidFill>
+              </a:rPr>
+              <a:t>Fat. Daily recommendation = 65g</a:t>
+            </a:r>
+            <a:endParaRPr lang="en-US" sz="1600" dirty="0">
+              <a:solidFill>
+                <a:srgbClr val="505050"/>
+              </a:solidFill>
+            </a:endParaRPr>
+          </a:p>
+        </p:txBody>
+      </p:sp>
+      <p:sp>
+        <p:nvSpPr>
+          <p:cNvPr id="21" name="Title 1"/>
+          <p:cNvSpPr txBox="1">
+            <a:spLocks/>
+          </p:cNvSpPr>
+          <p:nvPr/>
+        </p:nvSpPr>
+        <p:spPr>
+          <a:xfrm>
+            <a:off x="6553201" y="4435087"/>
+            <a:ext cx="2590799" cy="691434"/>
           </a:xfrm>
           <a:prstGeom prst="rect">
             <a:avLst/>
@@ -9285,13 +11666,21 @@
               </a:rPr>
               <a:t>Source: </a:t>
             </a:r>
+            <a:endParaRPr lang="en-US" sz="1200" dirty="0" smtClean="0">
+              <a:solidFill>
+                <a:srgbClr val="505050"/>
+              </a:solidFill>
+            </a:endParaRPr>
+          </a:p>
+          <a:p>
+            <a:pPr algn="r"/>
             <a:r>
-              <a:rPr lang="en-US" sz="1200" dirty="0" err="1" smtClean="0">
+              <a:rPr lang="en-US" sz="1200" dirty="0" smtClean="0">
                 <a:solidFill>
                   <a:srgbClr val="505050"/>
                 </a:solidFill>
               </a:rPr>
-              <a:t>Rumpold</a:t>
+              <a:t>FAO, </a:t>
             </a:r>
             <a:r>
               <a:rPr lang="en-US" sz="1200" dirty="0" smtClean="0">
@@ -9299,23 +11688,18 @@
                   <a:srgbClr val="505050"/>
                 </a:solidFill>
               </a:rPr>
-              <a:t>, </a:t>
+              <a:t>2012</a:t>
             </a:r>
-            <a:r>
-              <a:rPr lang="en-US" sz="1200" dirty="0" err="1" smtClean="0">
-                <a:solidFill>
-                  <a:srgbClr val="505050"/>
-                </a:solidFill>
-              </a:rPr>
-              <a:t>Schluter</a:t>
-            </a:r>
+          </a:p>
+          <a:p>
+            <a:pPr algn="r"/>
             <a:r>
               <a:rPr lang="en-US" sz="1200" dirty="0" smtClean="0">
                 <a:solidFill>
                   <a:srgbClr val="505050"/>
                 </a:solidFill>
               </a:rPr>
-              <a:t>, 2012</a:t>
+              <a:t>www.wolframalpha.com</a:t>
             </a:r>
             <a:endParaRPr lang="en-US" sz="1200" dirty="0">
               <a:solidFill>
@@ -9328,7 +11712,1220 @@
     </p:spTree>
     <p:extLst>
       <p:ext uri="{BB962C8B-B14F-4D97-AF65-F5344CB8AC3E}">
-        <p14:creationId xmlns:p14="http://schemas.microsoft.com/office/powerpoint/2010/main" val="2685669578"/>
+        <p14:creationId xmlns:p14="http://schemas.microsoft.com/office/powerpoint/2010/main" val="2196096649"/>
+      </p:ext>
+    </p:extLst>
+  </p:cSld>
+  <p:clrMapOvr>
+    <a:masterClrMapping/>
+  </p:clrMapOvr>
+  <p:timing>
+    <p:tnLst>
+      <p:par>
+        <p:cTn id="1" dur="indefinite" restart="never" nodeType="tmRoot"/>
+      </p:par>
+    </p:tnLst>
+  </p:timing>
+</p:sld>
+</file>
+
+<file path=ppt/slides/slide14.xml><?xml version="1.0" encoding="utf-8"?>
+<p:sld xmlns:a="http://schemas.openxmlformats.org/drawingml/2006/main" xmlns:r="http://schemas.openxmlformats.org/officeDocument/2006/relationships" xmlns:p="http://schemas.openxmlformats.org/presentationml/2006/main">
+  <p:cSld>
+    <p:spTree>
+      <p:nvGrpSpPr>
+        <p:cNvPr id="1" name=""/>
+        <p:cNvGrpSpPr/>
+        <p:nvPr/>
+      </p:nvGrpSpPr>
+      <p:grpSpPr>
+        <a:xfrm>
+          <a:off x="0" y="0"/>
+          <a:ext cx="0" cy="0"/>
+          <a:chOff x="0" y="0"/>
+          <a:chExt cx="0" cy="0"/>
+        </a:xfrm>
+      </p:grpSpPr>
+      <p:grpSp>
+        <p:nvGrpSpPr>
+          <p:cNvPr id="14" name="Group 13"/>
+          <p:cNvGrpSpPr/>
+          <p:nvPr/>
+        </p:nvGrpSpPr>
+        <p:grpSpPr>
+          <a:xfrm>
+            <a:off x="4941849" y="2603562"/>
+            <a:ext cx="1828800" cy="1828800"/>
+            <a:chOff x="6562390" y="2694811"/>
+            <a:chExt cx="1828800" cy="1828800"/>
+          </a:xfrm>
+        </p:grpSpPr>
+        <p:grpSp>
+          <p:nvGrpSpPr>
+            <p:cNvPr id="22" name="Group 21"/>
+            <p:cNvGrpSpPr/>
+            <p:nvPr/>
+          </p:nvGrpSpPr>
+          <p:grpSpPr>
+            <a:xfrm>
+              <a:off x="6562390" y="2694811"/>
+              <a:ext cx="1828800" cy="1828800"/>
+              <a:chOff x="1676400" y="1759765"/>
+              <a:chExt cx="1828800" cy="1828800"/>
+            </a:xfrm>
+          </p:grpSpPr>
+          <p:sp>
+            <p:nvSpPr>
+              <p:cNvPr id="24" name="Oval 23"/>
+              <p:cNvSpPr/>
+              <p:nvPr/>
+            </p:nvSpPr>
+            <p:spPr>
+              <a:xfrm>
+                <a:off x="1676400" y="1759765"/>
+                <a:ext cx="1828800" cy="1828800"/>
+              </a:xfrm>
+              <a:prstGeom prst="ellipse">
+                <a:avLst/>
+              </a:prstGeom>
+              <a:solidFill>
+                <a:srgbClr val="9BD7D5"/>
+              </a:solidFill>
+              <a:ln>
+                <a:noFill/>
+              </a:ln>
+            </p:spPr>
+            <p:style>
+              <a:lnRef idx="2">
+                <a:schemeClr val="accent1">
+                  <a:shade val="50000"/>
+                </a:schemeClr>
+              </a:lnRef>
+              <a:fillRef idx="1">
+                <a:schemeClr val="accent1"/>
+              </a:fillRef>
+              <a:effectRef idx="0">
+                <a:schemeClr val="accent1"/>
+              </a:effectRef>
+              <a:fontRef idx="minor">
+                <a:schemeClr val="lt1"/>
+              </a:fontRef>
+            </p:style>
+            <p:txBody>
+              <a:bodyPr rtlCol="0" anchor="ctr"/>
+              <a:lstStyle/>
+              <a:p>
+                <a:pPr algn="ctr"/>
+                <a:endParaRPr lang="en-US"/>
+              </a:p>
+            </p:txBody>
+          </p:sp>
+          <p:sp>
+            <p:nvSpPr>
+              <p:cNvPr id="25" name="TextBox 24"/>
+              <p:cNvSpPr txBox="1"/>
+              <p:nvPr/>
+            </p:nvSpPr>
+            <p:spPr>
+              <a:xfrm>
+                <a:off x="1961622" y="2855904"/>
+                <a:ext cx="1336645" cy="523220"/>
+              </a:xfrm>
+              <a:prstGeom prst="rect">
+                <a:avLst/>
+              </a:prstGeom>
+              <a:noFill/>
+            </p:spPr>
+            <p:txBody>
+              <a:bodyPr wrap="square" rtlCol="0">
+                <a:spAutoFit/>
+              </a:bodyPr>
+              <a:lstStyle>
+                <a:lvl1pPr marL="0" indent="0">
+                  <a:defRPr sz="1100">
+                    <a:latin typeface="+mn-lt"/>
+                    <a:ea typeface="+mn-ea"/>
+                    <a:cs typeface="+mn-cs"/>
+                  </a:defRPr>
+                </a:lvl1pPr>
+                <a:lvl2pPr marL="457200" indent="0">
+                  <a:defRPr sz="1100">
+                    <a:latin typeface="+mn-lt"/>
+                    <a:ea typeface="+mn-ea"/>
+                    <a:cs typeface="+mn-cs"/>
+                  </a:defRPr>
+                </a:lvl2pPr>
+                <a:lvl3pPr marL="914400" indent="0">
+                  <a:defRPr sz="1100">
+                    <a:latin typeface="+mn-lt"/>
+                    <a:ea typeface="+mn-ea"/>
+                    <a:cs typeface="+mn-cs"/>
+                  </a:defRPr>
+                </a:lvl3pPr>
+                <a:lvl4pPr marL="1371600" indent="0">
+                  <a:defRPr sz="1100">
+                    <a:latin typeface="+mn-lt"/>
+                    <a:ea typeface="+mn-ea"/>
+                    <a:cs typeface="+mn-cs"/>
+                  </a:defRPr>
+                </a:lvl4pPr>
+                <a:lvl5pPr marL="1828800" indent="0">
+                  <a:defRPr sz="1100">
+                    <a:latin typeface="+mn-lt"/>
+                    <a:ea typeface="+mn-ea"/>
+                    <a:cs typeface="+mn-cs"/>
+                  </a:defRPr>
+                </a:lvl5pPr>
+                <a:lvl6pPr marL="2286000" indent="0">
+                  <a:defRPr sz="1100">
+                    <a:latin typeface="+mn-lt"/>
+                    <a:ea typeface="+mn-ea"/>
+                    <a:cs typeface="+mn-cs"/>
+                  </a:defRPr>
+                </a:lvl6pPr>
+                <a:lvl7pPr marL="2743200" indent="0">
+                  <a:defRPr sz="1100">
+                    <a:latin typeface="+mn-lt"/>
+                    <a:ea typeface="+mn-ea"/>
+                    <a:cs typeface="+mn-cs"/>
+                  </a:defRPr>
+                </a:lvl7pPr>
+                <a:lvl8pPr marL="3200400" indent="0">
+                  <a:defRPr sz="1100">
+                    <a:latin typeface="+mn-lt"/>
+                    <a:ea typeface="+mn-ea"/>
+                    <a:cs typeface="+mn-cs"/>
+                  </a:defRPr>
+                </a:lvl8pPr>
+                <a:lvl9pPr marL="3657600" indent="0">
+                  <a:defRPr sz="1100">
+                    <a:latin typeface="+mn-lt"/>
+                    <a:ea typeface="+mn-ea"/>
+                    <a:cs typeface="+mn-cs"/>
+                  </a:defRPr>
+                </a:lvl9pPr>
+              </a:lstStyle>
+              <a:p>
+                <a:pPr algn="ctr"/>
+                <a:r>
+                  <a:rPr lang="en-US" sz="1400" dirty="0" smtClean="0">
+                    <a:solidFill>
+                      <a:srgbClr val="505050"/>
+                    </a:solidFill>
+                  </a:rPr>
+                  <a:t>Beef</a:t>
+                </a:r>
+              </a:p>
+              <a:p>
+                <a:pPr algn="ctr"/>
+                <a:r>
+                  <a:rPr lang="en-US" sz="1400" dirty="0" smtClean="0">
+                    <a:solidFill>
+                      <a:srgbClr val="505050"/>
+                    </a:solidFill>
+                  </a:rPr>
+                  <a:t>297kcal/100g</a:t>
+                </a:r>
+                <a:endParaRPr lang="en-US" sz="1400" dirty="0">
+                  <a:solidFill>
+                    <a:srgbClr val="505050"/>
+                  </a:solidFill>
+                </a:endParaRPr>
+              </a:p>
+            </p:txBody>
+          </p:sp>
+        </p:grpSp>
+        <p:pic>
+          <p:nvPicPr>
+            <p:cNvPr id="1029" name="Picture 5" descr="C:\Users\Melinda Tjia\Pictures\Project\cow-silhouette-image.png"/>
+            <p:cNvPicPr>
+              <a:picLocks noChangeAspect="1" noChangeArrowheads="1"/>
+            </p:cNvPicPr>
+            <p:nvPr/>
+          </p:nvPicPr>
+          <p:blipFill>
+            <a:blip r:embed="rId2">
+              <a:extLst>
+                <a:ext uri="{28A0092B-C50C-407E-A947-70E740481C1C}">
+                  <a14:useLocalDpi xmlns:a14="http://schemas.microsoft.com/office/drawing/2010/main" val="0"/>
+                </a:ext>
+              </a:extLst>
+            </a:blip>
+            <a:srcRect/>
+            <a:stretch>
+              <a:fillRect/>
+            </a:stretch>
+          </p:blipFill>
+          <p:spPr bwMode="auto">
+            <a:xfrm>
+              <a:off x="7020634" y="2863442"/>
+              <a:ext cx="990600" cy="940616"/>
+            </a:xfrm>
+            <a:prstGeom prst="rect">
+              <a:avLst/>
+            </a:prstGeom>
+            <a:noFill/>
+            <a:extLst>
+              <a:ext uri="{909E8E84-426E-40DD-AFC4-6F175D3DCCD1}">
+                <a14:hiddenFill xmlns:a14="http://schemas.microsoft.com/office/drawing/2010/main">
+                  <a:solidFill>
+                    <a:srgbClr val="FFFFFF"/>
+                  </a:solidFill>
+                </a14:hiddenFill>
+              </a:ext>
+            </a:extLst>
+          </p:spPr>
+        </p:pic>
+      </p:grpSp>
+      <p:grpSp>
+        <p:nvGrpSpPr>
+          <p:cNvPr id="12" name="Group 11"/>
+          <p:cNvGrpSpPr/>
+          <p:nvPr/>
+        </p:nvGrpSpPr>
+        <p:grpSpPr>
+          <a:xfrm>
+            <a:off x="4485693" y="655295"/>
+            <a:ext cx="1828800" cy="1828800"/>
+            <a:chOff x="5410200" y="1371600"/>
+            <a:chExt cx="1828800" cy="1828800"/>
+          </a:xfrm>
+        </p:grpSpPr>
+        <p:grpSp>
+          <p:nvGrpSpPr>
+            <p:cNvPr id="15" name="Group 14"/>
+            <p:cNvGrpSpPr/>
+            <p:nvPr/>
+          </p:nvGrpSpPr>
+          <p:grpSpPr>
+            <a:xfrm>
+              <a:off x="5410200" y="1371600"/>
+              <a:ext cx="1828800" cy="1828800"/>
+              <a:chOff x="1676400" y="1759765"/>
+              <a:chExt cx="1828800" cy="1828800"/>
+            </a:xfrm>
+          </p:grpSpPr>
+          <p:sp>
+            <p:nvSpPr>
+              <p:cNvPr id="16" name="Oval 15"/>
+              <p:cNvSpPr/>
+              <p:nvPr/>
+            </p:nvSpPr>
+            <p:spPr>
+              <a:xfrm>
+                <a:off x="1676400" y="1759765"/>
+                <a:ext cx="1828800" cy="1828800"/>
+              </a:xfrm>
+              <a:prstGeom prst="ellipse">
+                <a:avLst/>
+              </a:prstGeom>
+              <a:solidFill>
+                <a:srgbClr val="9BD7D5"/>
+              </a:solidFill>
+              <a:ln>
+                <a:noFill/>
+              </a:ln>
+            </p:spPr>
+            <p:style>
+              <a:lnRef idx="2">
+                <a:schemeClr val="accent1">
+                  <a:shade val="50000"/>
+                </a:schemeClr>
+              </a:lnRef>
+              <a:fillRef idx="1">
+                <a:schemeClr val="accent1"/>
+              </a:fillRef>
+              <a:effectRef idx="0">
+                <a:schemeClr val="accent1"/>
+              </a:effectRef>
+              <a:fontRef idx="minor">
+                <a:schemeClr val="lt1"/>
+              </a:fontRef>
+            </p:style>
+            <p:txBody>
+              <a:bodyPr rtlCol="0" anchor="ctr"/>
+              <a:lstStyle/>
+              <a:p>
+                <a:pPr algn="ctr"/>
+                <a:endParaRPr lang="en-US"/>
+              </a:p>
+            </p:txBody>
+          </p:sp>
+          <p:sp>
+            <p:nvSpPr>
+              <p:cNvPr id="18" name="TextBox 17"/>
+              <p:cNvSpPr txBox="1"/>
+              <p:nvPr/>
+            </p:nvSpPr>
+            <p:spPr>
+              <a:xfrm>
+                <a:off x="1961622" y="2816770"/>
+                <a:ext cx="1336645" cy="523220"/>
+              </a:xfrm>
+              <a:prstGeom prst="rect">
+                <a:avLst/>
+              </a:prstGeom>
+              <a:noFill/>
+            </p:spPr>
+            <p:txBody>
+              <a:bodyPr wrap="square" rtlCol="0">
+                <a:spAutoFit/>
+              </a:bodyPr>
+              <a:lstStyle>
+                <a:lvl1pPr marL="0" indent="0">
+                  <a:defRPr sz="1100">
+                    <a:latin typeface="+mn-lt"/>
+                    <a:ea typeface="+mn-ea"/>
+                    <a:cs typeface="+mn-cs"/>
+                  </a:defRPr>
+                </a:lvl1pPr>
+                <a:lvl2pPr marL="457200" indent="0">
+                  <a:defRPr sz="1100">
+                    <a:latin typeface="+mn-lt"/>
+                    <a:ea typeface="+mn-ea"/>
+                    <a:cs typeface="+mn-cs"/>
+                  </a:defRPr>
+                </a:lvl2pPr>
+                <a:lvl3pPr marL="914400" indent="0">
+                  <a:defRPr sz="1100">
+                    <a:latin typeface="+mn-lt"/>
+                    <a:ea typeface="+mn-ea"/>
+                    <a:cs typeface="+mn-cs"/>
+                  </a:defRPr>
+                </a:lvl3pPr>
+                <a:lvl4pPr marL="1371600" indent="0">
+                  <a:defRPr sz="1100">
+                    <a:latin typeface="+mn-lt"/>
+                    <a:ea typeface="+mn-ea"/>
+                    <a:cs typeface="+mn-cs"/>
+                  </a:defRPr>
+                </a:lvl4pPr>
+                <a:lvl5pPr marL="1828800" indent="0">
+                  <a:defRPr sz="1100">
+                    <a:latin typeface="+mn-lt"/>
+                    <a:ea typeface="+mn-ea"/>
+                    <a:cs typeface="+mn-cs"/>
+                  </a:defRPr>
+                </a:lvl5pPr>
+                <a:lvl6pPr marL="2286000" indent="0">
+                  <a:defRPr sz="1100">
+                    <a:latin typeface="+mn-lt"/>
+                    <a:ea typeface="+mn-ea"/>
+                    <a:cs typeface="+mn-cs"/>
+                  </a:defRPr>
+                </a:lvl6pPr>
+                <a:lvl7pPr marL="2743200" indent="0">
+                  <a:defRPr sz="1100">
+                    <a:latin typeface="+mn-lt"/>
+                    <a:ea typeface="+mn-ea"/>
+                    <a:cs typeface="+mn-cs"/>
+                  </a:defRPr>
+                </a:lvl7pPr>
+                <a:lvl8pPr marL="3200400" indent="0">
+                  <a:defRPr sz="1100">
+                    <a:latin typeface="+mn-lt"/>
+                    <a:ea typeface="+mn-ea"/>
+                    <a:cs typeface="+mn-cs"/>
+                  </a:defRPr>
+                </a:lvl8pPr>
+                <a:lvl9pPr marL="3657600" indent="0">
+                  <a:defRPr sz="1100">
+                    <a:latin typeface="+mn-lt"/>
+                    <a:ea typeface="+mn-ea"/>
+                    <a:cs typeface="+mn-cs"/>
+                  </a:defRPr>
+                </a:lvl9pPr>
+              </a:lstStyle>
+              <a:p>
+                <a:pPr algn="ctr"/>
+                <a:r>
+                  <a:rPr lang="en-US" sz="1400" dirty="0" smtClean="0">
+                    <a:solidFill>
+                      <a:srgbClr val="505050"/>
+                    </a:solidFill>
+                  </a:rPr>
+                  <a:t>Mealworm</a:t>
+                </a:r>
+              </a:p>
+              <a:p>
+                <a:pPr algn="ctr"/>
+                <a:r>
+                  <a:rPr lang="en-US" sz="1400" dirty="0" smtClean="0">
+                    <a:solidFill>
+                      <a:srgbClr val="505050"/>
+                    </a:solidFill>
+                  </a:rPr>
+                  <a:t>206 kcal/100g</a:t>
+                </a:r>
+                <a:endParaRPr lang="en-US" sz="1400" dirty="0">
+                  <a:solidFill>
+                    <a:srgbClr val="505050"/>
+                  </a:solidFill>
+                </a:endParaRPr>
+              </a:p>
+            </p:txBody>
+          </p:sp>
+        </p:grpSp>
+        <p:pic>
+          <p:nvPicPr>
+            <p:cNvPr id="1028" name="Picture 4" descr="C:\Users\Melinda Tjia\Pictures\Project\mealworm.png"/>
+            <p:cNvPicPr>
+              <a:picLocks noChangeAspect="1" noChangeArrowheads="1"/>
+            </p:cNvPicPr>
+            <p:nvPr/>
+          </p:nvPicPr>
+          <p:blipFill>
+            <a:blip r:embed="rId3" cstate="print">
+              <a:biLevel thresh="75000"/>
+              <a:extLst>
+                <a:ext uri="{28A0092B-C50C-407E-A947-70E740481C1C}">
+                  <a14:useLocalDpi xmlns:a14="http://schemas.microsoft.com/office/drawing/2010/main" val="0"/>
+                </a:ext>
+              </a:extLst>
+            </a:blip>
+            <a:srcRect/>
+            <a:stretch>
+              <a:fillRect/>
+            </a:stretch>
+          </p:blipFill>
+          <p:spPr bwMode="auto">
+            <a:xfrm>
+              <a:off x="5889679" y="1609732"/>
+              <a:ext cx="869842" cy="817170"/>
+            </a:xfrm>
+            <a:prstGeom prst="rect">
+              <a:avLst/>
+            </a:prstGeom>
+            <a:noFill/>
+            <a:extLst>
+              <a:ext uri="{909E8E84-426E-40DD-AFC4-6F175D3DCCD1}">
+                <a14:hiddenFill xmlns:a14="http://schemas.microsoft.com/office/drawing/2010/main">
+                  <a:solidFill>
+                    <a:srgbClr val="FFFFFF"/>
+                  </a:solidFill>
+                </a14:hiddenFill>
+              </a:ext>
+            </a:extLst>
+          </p:spPr>
+        </p:pic>
+      </p:grpSp>
+      <p:grpSp>
+        <p:nvGrpSpPr>
+          <p:cNvPr id="11" name="Group 10"/>
+          <p:cNvGrpSpPr/>
+          <p:nvPr/>
+        </p:nvGrpSpPr>
+        <p:grpSpPr>
+          <a:xfrm>
+            <a:off x="2288105" y="2176899"/>
+            <a:ext cx="1828800" cy="1828800"/>
+            <a:chOff x="1676400" y="1759765"/>
+            <a:chExt cx="1828800" cy="1828800"/>
+          </a:xfrm>
+        </p:grpSpPr>
+        <p:sp>
+          <p:nvSpPr>
+            <p:cNvPr id="9" name="Oval 8"/>
+            <p:cNvSpPr/>
+            <p:nvPr/>
+          </p:nvSpPr>
+          <p:spPr>
+            <a:xfrm>
+              <a:off x="1676400" y="1759765"/>
+              <a:ext cx="1828800" cy="1828800"/>
+            </a:xfrm>
+            <a:prstGeom prst="ellipse">
+              <a:avLst/>
+            </a:prstGeom>
+            <a:solidFill>
+              <a:srgbClr val="9BD7D5"/>
+            </a:solidFill>
+            <a:ln>
+              <a:noFill/>
+            </a:ln>
+          </p:spPr>
+          <p:style>
+            <a:lnRef idx="2">
+              <a:schemeClr val="accent1">
+                <a:shade val="50000"/>
+              </a:schemeClr>
+            </a:lnRef>
+            <a:fillRef idx="1">
+              <a:schemeClr val="accent1"/>
+            </a:fillRef>
+            <a:effectRef idx="0">
+              <a:schemeClr val="accent1"/>
+            </a:effectRef>
+            <a:fontRef idx="minor">
+              <a:schemeClr val="lt1"/>
+            </a:fontRef>
+          </p:style>
+          <p:txBody>
+            <a:bodyPr rtlCol="0" anchor="ctr"/>
+            <a:lstStyle/>
+            <a:p>
+              <a:pPr algn="ctr"/>
+              <a:endParaRPr lang="en-US"/>
+            </a:p>
+          </p:txBody>
+        </p:sp>
+        <p:pic>
+          <p:nvPicPr>
+            <p:cNvPr id="1027" name="Picture 3" descr="C:\Users\Melinda Tjia\Pictures\Project\beetle.png"/>
+            <p:cNvPicPr>
+              <a:picLocks noChangeAspect="1" noChangeArrowheads="1"/>
+            </p:cNvPicPr>
+            <p:nvPr/>
+          </p:nvPicPr>
+          <p:blipFill>
+            <a:blip r:embed="rId4" cstate="print">
+              <a:biLevel thresh="75000"/>
+              <a:extLst>
+                <a:ext uri="{28A0092B-C50C-407E-A947-70E740481C1C}">
+                  <a14:useLocalDpi xmlns:a14="http://schemas.microsoft.com/office/drawing/2010/main" val="0"/>
+                </a:ext>
+              </a:extLst>
+            </a:blip>
+            <a:srcRect/>
+            <a:stretch>
+              <a:fillRect/>
+            </a:stretch>
+          </p:blipFill>
+          <p:spPr bwMode="auto">
+            <a:xfrm>
+              <a:off x="2198957" y="1932370"/>
+              <a:ext cx="783686" cy="962264"/>
+            </a:xfrm>
+            <a:prstGeom prst="rect">
+              <a:avLst/>
+            </a:prstGeom>
+            <a:noFill/>
+            <a:extLst>
+              <a:ext uri="{909E8E84-426E-40DD-AFC4-6F175D3DCCD1}">
+                <a14:hiddenFill xmlns:a14="http://schemas.microsoft.com/office/drawing/2010/main">
+                  <a:solidFill>
+                    <a:srgbClr val="FFFFFF"/>
+                  </a:solidFill>
+                </a14:hiddenFill>
+              </a:ext>
+            </a:extLst>
+          </p:spPr>
+        </p:pic>
+        <p:sp>
+          <p:nvSpPr>
+            <p:cNvPr id="13" name="TextBox 12"/>
+            <p:cNvSpPr txBox="1"/>
+            <p:nvPr/>
+          </p:nvSpPr>
+          <p:spPr>
+            <a:xfrm>
+              <a:off x="1961622" y="2839218"/>
+              <a:ext cx="1336645" cy="523220"/>
+            </a:xfrm>
+            <a:prstGeom prst="rect">
+              <a:avLst/>
+            </a:prstGeom>
+            <a:noFill/>
+          </p:spPr>
+          <p:txBody>
+            <a:bodyPr wrap="square" rtlCol="0">
+              <a:spAutoFit/>
+            </a:bodyPr>
+            <a:lstStyle>
+              <a:lvl1pPr marL="0" indent="0">
+                <a:defRPr sz="1100">
+                  <a:latin typeface="+mn-lt"/>
+                  <a:ea typeface="+mn-ea"/>
+                  <a:cs typeface="+mn-cs"/>
+                </a:defRPr>
+              </a:lvl1pPr>
+              <a:lvl2pPr marL="457200" indent="0">
+                <a:defRPr sz="1100">
+                  <a:latin typeface="+mn-lt"/>
+                  <a:ea typeface="+mn-ea"/>
+                  <a:cs typeface="+mn-cs"/>
+                </a:defRPr>
+              </a:lvl2pPr>
+              <a:lvl3pPr marL="914400" indent="0">
+                <a:defRPr sz="1100">
+                  <a:latin typeface="+mn-lt"/>
+                  <a:ea typeface="+mn-ea"/>
+                  <a:cs typeface="+mn-cs"/>
+                </a:defRPr>
+              </a:lvl3pPr>
+              <a:lvl4pPr marL="1371600" indent="0">
+                <a:defRPr sz="1100">
+                  <a:latin typeface="+mn-lt"/>
+                  <a:ea typeface="+mn-ea"/>
+                  <a:cs typeface="+mn-cs"/>
+                </a:defRPr>
+              </a:lvl4pPr>
+              <a:lvl5pPr marL="1828800" indent="0">
+                <a:defRPr sz="1100">
+                  <a:latin typeface="+mn-lt"/>
+                  <a:ea typeface="+mn-ea"/>
+                  <a:cs typeface="+mn-cs"/>
+                </a:defRPr>
+              </a:lvl5pPr>
+              <a:lvl6pPr marL="2286000" indent="0">
+                <a:defRPr sz="1100">
+                  <a:latin typeface="+mn-lt"/>
+                  <a:ea typeface="+mn-ea"/>
+                  <a:cs typeface="+mn-cs"/>
+                </a:defRPr>
+              </a:lvl6pPr>
+              <a:lvl7pPr marL="2743200" indent="0">
+                <a:defRPr sz="1100">
+                  <a:latin typeface="+mn-lt"/>
+                  <a:ea typeface="+mn-ea"/>
+                  <a:cs typeface="+mn-cs"/>
+                </a:defRPr>
+              </a:lvl7pPr>
+              <a:lvl8pPr marL="3200400" indent="0">
+                <a:defRPr sz="1100">
+                  <a:latin typeface="+mn-lt"/>
+                  <a:ea typeface="+mn-ea"/>
+                  <a:cs typeface="+mn-cs"/>
+                </a:defRPr>
+              </a:lvl8pPr>
+              <a:lvl9pPr marL="3657600" indent="0">
+                <a:defRPr sz="1100">
+                  <a:latin typeface="+mn-lt"/>
+                  <a:ea typeface="+mn-ea"/>
+                  <a:cs typeface="+mn-cs"/>
+                </a:defRPr>
+              </a:lvl9pPr>
+            </a:lstStyle>
+            <a:p>
+              <a:pPr algn="ctr"/>
+              <a:r>
+                <a:rPr lang="en-US" sz="1400" dirty="0" smtClean="0">
+                  <a:solidFill>
+                    <a:srgbClr val="505050"/>
+                  </a:solidFill>
+                </a:rPr>
+                <a:t>Beetle</a:t>
+              </a:r>
+              <a:endParaRPr lang="en-US" sz="1400" dirty="0" smtClean="0">
+                <a:solidFill>
+                  <a:srgbClr val="505050"/>
+                </a:solidFill>
+              </a:endParaRPr>
+            </a:p>
+            <a:p>
+              <a:pPr algn="ctr"/>
+              <a:r>
+                <a:rPr lang="en-US" sz="1400" dirty="0" smtClean="0">
+                  <a:solidFill>
+                    <a:srgbClr val="505050"/>
+                  </a:solidFill>
+                </a:rPr>
+                <a:t>138 kcal/100g</a:t>
+              </a:r>
+              <a:endParaRPr lang="en-US" sz="1400" dirty="0">
+                <a:solidFill>
+                  <a:srgbClr val="505050"/>
+                </a:solidFill>
+              </a:endParaRPr>
+            </a:p>
+          </p:txBody>
+        </p:sp>
+      </p:grpSp>
+      <p:sp>
+        <p:nvSpPr>
+          <p:cNvPr id="2" name="Title 1"/>
+          <p:cNvSpPr txBox="1">
+            <a:spLocks/>
+          </p:cNvSpPr>
+          <p:nvPr/>
+        </p:nvSpPr>
+        <p:spPr>
+          <a:xfrm>
+            <a:off x="457200" y="228600"/>
+            <a:ext cx="8229600" cy="1143000"/>
+          </a:xfrm>
+          <a:prstGeom prst="rect">
+            <a:avLst/>
+          </a:prstGeom>
+        </p:spPr>
+        <p:txBody>
+          <a:bodyPr vert="horz" lIns="91440" tIns="45720" rIns="91440" bIns="45720" rtlCol="0" anchor="ctr">
+            <a:normAutofit/>
+          </a:bodyPr>
+          <a:lstStyle>
+            <a:lvl1pPr algn="ctr" defTabSz="914400" rtl="0" eaLnBrk="1" latinLnBrk="0" hangingPunct="1">
+              <a:spcBef>
+                <a:spcPct val="0"/>
+              </a:spcBef>
+              <a:buNone/>
+              <a:defRPr sz="4400" kern="1200">
+                <a:solidFill>
+                  <a:schemeClr val="tx1"/>
+                </a:solidFill>
+                <a:latin typeface="+mj-lt"/>
+                <a:ea typeface="+mj-ea"/>
+                <a:cs typeface="+mj-cs"/>
+              </a:defRPr>
+            </a:lvl1pPr>
+          </a:lstStyle>
+          <a:p>
+            <a:pPr algn="l"/>
+            <a:r>
+              <a:rPr lang="en-US" dirty="0" smtClean="0">
+                <a:solidFill>
+                  <a:srgbClr val="129793"/>
+                </a:solidFill>
+              </a:rPr>
+              <a:t>Content</a:t>
+            </a:r>
+            <a:endParaRPr lang="en-US" dirty="0">
+              <a:solidFill>
+                <a:srgbClr val="129793"/>
+              </a:solidFill>
+            </a:endParaRPr>
+          </a:p>
+        </p:txBody>
+      </p:sp>
+      <p:sp>
+        <p:nvSpPr>
+          <p:cNvPr id="3" name="Right Triangle 2"/>
+          <p:cNvSpPr/>
+          <p:nvPr/>
+        </p:nvSpPr>
+        <p:spPr>
+          <a:xfrm rot="10800000">
+            <a:off x="6096000" y="0"/>
+            <a:ext cx="3048000" cy="1569694"/>
+          </a:xfrm>
+          <a:prstGeom prst="rtTriangle">
+            <a:avLst/>
+          </a:prstGeom>
+          <a:solidFill>
+            <a:srgbClr val="9BD7D5"/>
+          </a:solidFill>
+          <a:ln>
+            <a:solidFill>
+              <a:srgbClr val="9BD7D5"/>
+            </a:solidFill>
+          </a:ln>
+        </p:spPr>
+        <p:style>
+          <a:lnRef idx="2">
+            <a:schemeClr val="accent1">
+              <a:shade val="50000"/>
+            </a:schemeClr>
+          </a:lnRef>
+          <a:fillRef idx="1">
+            <a:schemeClr val="accent1"/>
+          </a:fillRef>
+          <a:effectRef idx="0">
+            <a:schemeClr val="accent1"/>
+          </a:effectRef>
+          <a:fontRef idx="minor">
+            <a:schemeClr val="lt1"/>
+          </a:fontRef>
+        </p:style>
+        <p:txBody>
+          <a:bodyPr rtlCol="0" anchor="ctr"/>
+          <a:lstStyle/>
+          <a:p>
+            <a:pPr algn="ctr"/>
+            <a:endParaRPr lang="en-US"/>
+          </a:p>
+        </p:txBody>
+      </p:sp>
+      <p:grpSp>
+        <p:nvGrpSpPr>
+          <p:cNvPr id="4" name="Group 3"/>
+          <p:cNvGrpSpPr/>
+          <p:nvPr/>
+        </p:nvGrpSpPr>
+        <p:grpSpPr>
+          <a:xfrm>
+            <a:off x="1733" y="1150595"/>
+            <a:ext cx="3960667" cy="419100"/>
+            <a:chOff x="1733" y="1150595"/>
+            <a:chExt cx="3960667" cy="419100"/>
+          </a:xfrm>
+        </p:grpSpPr>
+        <p:sp>
+          <p:nvSpPr>
+            <p:cNvPr id="5" name="Pentagon 4"/>
+            <p:cNvSpPr/>
+            <p:nvPr/>
+          </p:nvSpPr>
+          <p:spPr>
+            <a:xfrm>
+              <a:off x="1733" y="1150595"/>
+              <a:ext cx="3960667" cy="419100"/>
+            </a:xfrm>
+            <a:prstGeom prst="homePlate">
+              <a:avLst/>
+            </a:prstGeom>
+            <a:solidFill>
+              <a:srgbClr val="505050"/>
+            </a:solidFill>
+            <a:ln>
+              <a:solidFill>
+                <a:srgbClr val="505050"/>
+              </a:solidFill>
+            </a:ln>
+          </p:spPr>
+          <p:style>
+            <a:lnRef idx="2">
+              <a:schemeClr val="accent1">
+                <a:shade val="50000"/>
+              </a:schemeClr>
+            </a:lnRef>
+            <a:fillRef idx="1">
+              <a:schemeClr val="accent1"/>
+            </a:fillRef>
+            <a:effectRef idx="0">
+              <a:schemeClr val="accent1"/>
+            </a:effectRef>
+            <a:fontRef idx="minor">
+              <a:schemeClr val="lt1"/>
+            </a:fontRef>
+          </p:style>
+          <p:txBody>
+            <a:bodyPr rtlCol="0" anchor="ctr"/>
+            <a:lstStyle/>
+            <a:p>
+              <a:pPr algn="ctr"/>
+              <a:endParaRPr lang="en-US"/>
+            </a:p>
+          </p:txBody>
+        </p:sp>
+        <p:sp>
+          <p:nvSpPr>
+            <p:cNvPr id="6" name="TextBox 5"/>
+            <p:cNvSpPr txBox="1"/>
+            <p:nvPr/>
+          </p:nvSpPr>
+          <p:spPr>
+            <a:xfrm>
+              <a:off x="153916" y="1160090"/>
+              <a:ext cx="2803596" cy="400110"/>
+            </a:xfrm>
+            <a:prstGeom prst="rect">
+              <a:avLst/>
+            </a:prstGeom>
+            <a:noFill/>
+          </p:spPr>
+          <p:txBody>
+            <a:bodyPr wrap="square" rtlCol="0">
+              <a:spAutoFit/>
+            </a:bodyPr>
+            <a:lstStyle/>
+            <a:p>
+              <a:r>
+                <a:rPr lang="en-US" sz="2000" dirty="0" smtClean="0">
+                  <a:solidFill>
+                    <a:schemeClr val="bg1"/>
+                  </a:solidFill>
+                </a:rPr>
+                <a:t>Norm – Nutritional Value</a:t>
+              </a:r>
+              <a:endParaRPr lang="en-US" sz="2000" dirty="0">
+                <a:solidFill>
+                  <a:schemeClr val="bg1"/>
+                </a:solidFill>
+              </a:endParaRPr>
+            </a:p>
+          </p:txBody>
+        </p:sp>
+      </p:grpSp>
+      <p:pic>
+        <p:nvPicPr>
+          <p:cNvPr id="7" name="Picture 5" descr="C:\Users\Melinda Tjia\Desktop\dll\png\basic.png"/>
+          <p:cNvPicPr>
+            <a:picLocks noChangeAspect="1" noChangeArrowheads="1"/>
+          </p:cNvPicPr>
+          <p:nvPr/>
+        </p:nvPicPr>
+        <p:blipFill>
+          <a:blip r:embed="rId5" cstate="print">
+            <a:biLevel thresh="25000"/>
+            <a:extLst>
+              <a:ext uri="{28A0092B-C50C-407E-A947-70E740481C1C}">
+                <a14:useLocalDpi xmlns:a14="http://schemas.microsoft.com/office/drawing/2010/main" val="0"/>
+              </a:ext>
+            </a:extLst>
+          </a:blip>
+          <a:srcRect/>
+          <a:stretch>
+            <a:fillRect/>
+          </a:stretch>
+        </p:blipFill>
+        <p:spPr bwMode="auto">
+          <a:xfrm>
+            <a:off x="2514600" y="434632"/>
+            <a:ext cx="700430" cy="700430"/>
+          </a:xfrm>
+          <a:prstGeom prst="rect">
+            <a:avLst/>
+          </a:prstGeom>
+          <a:noFill/>
+          <a:extLst>
+            <a:ext uri="{909E8E84-426E-40DD-AFC4-6F175D3DCCD1}">
+              <a14:hiddenFill xmlns:a14="http://schemas.microsoft.com/office/drawing/2010/main">
+                <a:solidFill>
+                  <a:srgbClr val="FFFFFF"/>
+                </a:solidFill>
+              </a14:hiddenFill>
+            </a:ext>
+          </a:extLst>
+        </p:spPr>
+      </p:pic>
+      <p:pic>
+        <p:nvPicPr>
+          <p:cNvPr id="1026" name="Picture 2" descr="C:\Users\Melinda Tjia\Pictures\Project\33mlyqg.jpg"/>
+          <p:cNvPicPr>
+            <a:picLocks noChangeAspect="1" noChangeArrowheads="1"/>
+          </p:cNvPicPr>
+          <p:nvPr/>
+        </p:nvPicPr>
+        <p:blipFill rotWithShape="1">
+          <a:blip r:embed="rId6" cstate="print">
+            <a:lum bright="70000" contrast="-70000"/>
+            <a:extLst>
+              <a:ext uri="{BEBA8EAE-BF5A-486C-A8C5-ECC9F3942E4B}">
+                <a14:imgProps xmlns:a14="http://schemas.microsoft.com/office/drawing/2010/main">
+                  <a14:imgLayer r:embed="rId7">
+                    <a14:imgEffect>
+                      <a14:backgroundRemoval t="13688" b="96688" l="24399" r="75000"/>
+                    </a14:imgEffect>
+                    <a14:imgEffect>
+                      <a14:brightnessContrast contrast="-40000"/>
+                    </a14:imgEffect>
+                  </a14:imgLayer>
+                </a14:imgProps>
+              </a:ext>
+              <a:ext uri="{28A0092B-C50C-407E-A947-70E740481C1C}">
+                <a14:useLocalDpi xmlns:a14="http://schemas.microsoft.com/office/drawing/2010/main" val="0"/>
+              </a:ext>
+            </a:extLst>
+          </a:blip>
+          <a:srcRect l="23843" t="11623" r="21631"/>
+          <a:stretch/>
+        </p:blipFill>
+        <p:spPr bwMode="auto">
+          <a:xfrm>
+            <a:off x="4127190" y="2064445"/>
+            <a:ext cx="814659" cy="2259903"/>
+          </a:xfrm>
+          <a:prstGeom prst="rect">
+            <a:avLst/>
+          </a:prstGeom>
+          <a:noFill/>
+          <a:extLst>
+            <a:ext uri="{909E8E84-426E-40DD-AFC4-6F175D3DCCD1}">
+              <a14:hiddenFill xmlns:a14="http://schemas.microsoft.com/office/drawing/2010/main">
+                <a:solidFill>
+                  <a:srgbClr val="FFFFFF"/>
+                </a:solidFill>
+              </a14:hiddenFill>
+            </a:ext>
+          </a:extLst>
+        </p:spPr>
+      </p:pic>
+      <p:sp>
+        <p:nvSpPr>
+          <p:cNvPr id="10" name="TextBox 12"/>
+          <p:cNvSpPr txBox="1"/>
+          <p:nvPr/>
+        </p:nvSpPr>
+        <p:spPr>
+          <a:xfrm>
+            <a:off x="3436315" y="4324350"/>
+            <a:ext cx="2271370" cy="707886"/>
+          </a:xfrm>
+          <a:prstGeom prst="rect">
+            <a:avLst/>
+          </a:prstGeom>
+          <a:noFill/>
+        </p:spPr>
+        <p:txBody>
+          <a:bodyPr wrap="square" rtlCol="0">
+            <a:spAutoFit/>
+          </a:bodyPr>
+          <a:lstStyle>
+            <a:lvl1pPr marL="0" indent="0">
+              <a:defRPr sz="1100">
+                <a:latin typeface="+mn-lt"/>
+                <a:ea typeface="+mn-ea"/>
+                <a:cs typeface="+mn-cs"/>
+              </a:defRPr>
+            </a:lvl1pPr>
+            <a:lvl2pPr marL="457200" indent="0">
+              <a:defRPr sz="1100">
+                <a:latin typeface="+mn-lt"/>
+                <a:ea typeface="+mn-ea"/>
+                <a:cs typeface="+mn-cs"/>
+              </a:defRPr>
+            </a:lvl2pPr>
+            <a:lvl3pPr marL="914400" indent="0">
+              <a:defRPr sz="1100">
+                <a:latin typeface="+mn-lt"/>
+                <a:ea typeface="+mn-ea"/>
+                <a:cs typeface="+mn-cs"/>
+              </a:defRPr>
+            </a:lvl3pPr>
+            <a:lvl4pPr marL="1371600" indent="0">
+              <a:defRPr sz="1100">
+                <a:latin typeface="+mn-lt"/>
+                <a:ea typeface="+mn-ea"/>
+                <a:cs typeface="+mn-cs"/>
+              </a:defRPr>
+            </a:lvl4pPr>
+            <a:lvl5pPr marL="1828800" indent="0">
+              <a:defRPr sz="1100">
+                <a:latin typeface="+mn-lt"/>
+                <a:ea typeface="+mn-ea"/>
+                <a:cs typeface="+mn-cs"/>
+              </a:defRPr>
+            </a:lvl5pPr>
+            <a:lvl6pPr marL="2286000" indent="0">
+              <a:defRPr sz="1100">
+                <a:latin typeface="+mn-lt"/>
+                <a:ea typeface="+mn-ea"/>
+                <a:cs typeface="+mn-cs"/>
+              </a:defRPr>
+            </a:lvl6pPr>
+            <a:lvl7pPr marL="2743200" indent="0">
+              <a:defRPr sz="1100">
+                <a:latin typeface="+mn-lt"/>
+                <a:ea typeface="+mn-ea"/>
+                <a:cs typeface="+mn-cs"/>
+              </a:defRPr>
+            </a:lvl7pPr>
+            <a:lvl8pPr marL="3200400" indent="0">
+              <a:defRPr sz="1100">
+                <a:latin typeface="+mn-lt"/>
+                <a:ea typeface="+mn-ea"/>
+                <a:cs typeface="+mn-cs"/>
+              </a:defRPr>
+            </a:lvl8pPr>
+            <a:lvl9pPr marL="3657600" indent="0">
+              <a:defRPr sz="1100">
+                <a:latin typeface="+mn-lt"/>
+                <a:ea typeface="+mn-ea"/>
+                <a:cs typeface="+mn-cs"/>
+              </a:defRPr>
+            </a:lvl9pPr>
+          </a:lstStyle>
+          <a:p>
+            <a:pPr algn="ctr"/>
+            <a:r>
+              <a:rPr lang="en-US" sz="2000" dirty="0" smtClean="0">
+                <a:solidFill>
+                  <a:srgbClr val="505050"/>
+                </a:solidFill>
+              </a:rPr>
+              <a:t>Human daily need: 1600 – 2800 kcal</a:t>
+            </a:r>
+            <a:endParaRPr lang="en-US" sz="2000" dirty="0">
+              <a:solidFill>
+                <a:srgbClr val="505050"/>
+              </a:solidFill>
+            </a:endParaRPr>
+          </a:p>
+        </p:txBody>
+      </p:sp>
+      <p:sp>
+        <p:nvSpPr>
+          <p:cNvPr id="29" name="Title 1"/>
+          <p:cNvSpPr txBox="1">
+            <a:spLocks/>
+          </p:cNvSpPr>
+          <p:nvPr/>
+        </p:nvSpPr>
+        <p:spPr>
+          <a:xfrm>
+            <a:off x="6553201" y="4435087"/>
+            <a:ext cx="2590799" cy="691434"/>
+          </a:xfrm>
+          <a:prstGeom prst="rect">
+            <a:avLst/>
+          </a:prstGeom>
+        </p:spPr>
+        <p:txBody>
+          <a:bodyPr vert="horz" lIns="91440" tIns="45720" rIns="91440" bIns="45720" rtlCol="0" anchor="ctr">
+            <a:normAutofit/>
+          </a:bodyPr>
+          <a:lstStyle>
+            <a:lvl1pPr algn="ctr" defTabSz="914400" rtl="0" eaLnBrk="1" latinLnBrk="0" hangingPunct="1">
+              <a:spcBef>
+                <a:spcPct val="0"/>
+              </a:spcBef>
+              <a:buNone/>
+              <a:defRPr sz="4400" kern="1200">
+                <a:solidFill>
+                  <a:schemeClr val="tx1"/>
+                </a:solidFill>
+                <a:latin typeface="+mj-lt"/>
+                <a:ea typeface="+mj-ea"/>
+                <a:cs typeface="+mj-cs"/>
+              </a:defRPr>
+            </a:lvl1pPr>
+          </a:lstStyle>
+          <a:p>
+            <a:pPr algn="r"/>
+            <a:r>
+              <a:rPr lang="en-US" sz="1200" dirty="0" smtClean="0">
+                <a:solidFill>
+                  <a:srgbClr val="505050"/>
+                </a:solidFill>
+              </a:rPr>
+              <a:t>Source: </a:t>
+            </a:r>
+            <a:endParaRPr lang="en-US" sz="1200" dirty="0" smtClean="0">
+              <a:solidFill>
+                <a:srgbClr val="505050"/>
+              </a:solidFill>
+            </a:endParaRPr>
+          </a:p>
+          <a:p>
+            <a:pPr algn="r"/>
+            <a:r>
+              <a:rPr lang="en-US" sz="1200" dirty="0" smtClean="0">
+                <a:solidFill>
+                  <a:srgbClr val="505050"/>
+                </a:solidFill>
+              </a:rPr>
+              <a:t>FAO, </a:t>
+            </a:r>
+            <a:r>
+              <a:rPr lang="en-US" sz="1200" dirty="0" smtClean="0">
+                <a:solidFill>
+                  <a:srgbClr val="505050"/>
+                </a:solidFill>
+              </a:rPr>
+              <a:t>2012</a:t>
+            </a:r>
+          </a:p>
+          <a:p>
+            <a:pPr algn="r"/>
+            <a:r>
+              <a:rPr lang="en-US" sz="1200" dirty="0" smtClean="0">
+                <a:solidFill>
+                  <a:srgbClr val="505050"/>
+                </a:solidFill>
+              </a:rPr>
+              <a:t>www.wolframalpha.com</a:t>
+            </a:r>
+            <a:endParaRPr lang="en-US" sz="1200" dirty="0">
+              <a:solidFill>
+                <a:srgbClr val="505050"/>
+              </a:solidFill>
+            </a:endParaRPr>
+          </a:p>
+        </p:txBody>
+      </p:sp>
+    </p:spTree>
+    <p:extLst>
+      <p:ext uri="{BB962C8B-B14F-4D97-AF65-F5344CB8AC3E}">
+        <p14:creationId xmlns:p14="http://schemas.microsoft.com/office/powerpoint/2010/main" val="772647586"/>
       </p:ext>
     </p:extLst>
   </p:cSld>
@@ -11573,8 +15170,8 @@
         </p:nvSpPr>
         <p:spPr>
           <a:xfrm>
-            <a:off x="5701412" y="1276525"/>
-            <a:ext cx="2604388" cy="1143000"/>
+            <a:off x="6906673" y="3774691"/>
+            <a:ext cx="2161127" cy="1143000"/>
           </a:xfrm>
           <a:prstGeom prst="rect">
             <a:avLst/>
@@ -11582,7 +15179,7 @@
         </p:spPr>
         <p:txBody>
           <a:bodyPr vert="horz" lIns="91440" tIns="45720" rIns="91440" bIns="45720" rtlCol="0" anchor="ctr">
-            <a:normAutofit/>
+            <a:normAutofit fontScale="92500" lnSpcReduction="20000"/>
           </a:bodyPr>
           <a:lstStyle>
             <a:lvl1pPr algn="ctr" defTabSz="914400" rtl="0" eaLnBrk="1" latinLnBrk="0" hangingPunct="1">
@@ -11783,7 +15380,7 @@
           <p:nvPr>
             <p:extLst>
               <p:ext uri="{D42A27DB-BD31-4B8C-83A1-F6EECF244321}">
-                <p14:modId xmlns:p14="http://schemas.microsoft.com/office/powerpoint/2010/main" val="2505223052"/>
+                <p14:modId xmlns:p14="http://schemas.microsoft.com/office/powerpoint/2010/main" val="1734948869"/>
               </p:ext>
             </p:extLst>
           </p:nvPr>
@@ -12759,12 +16356,12 @@
                     <a:p>
                       <a:pPr algn="ctr" fontAlgn="ctr"/>
                       <a:r>
-                        <a:rPr lang="en-US" sz="1400" u="none" strike="noStrike">
+                        <a:rPr lang="en-US" sz="1400" u="none" strike="noStrike" dirty="0" smtClean="0">
                           <a:effectLst/>
                         </a:rPr>
-                        <a:t>0%</a:t>
+                        <a:t>70%</a:t>
                       </a:r>
-                      <a:endParaRPr lang="en-US" sz="1400" b="0" i="0" u="none" strike="noStrike">
+                      <a:endParaRPr lang="en-US" sz="1400" b="0" i="0" u="none" strike="noStrike" dirty="0">
                         <a:solidFill>
                           <a:srgbClr val="000000"/>
                         </a:solidFill>
@@ -12782,12 +16379,24 @@
                     <a:p>
                       <a:pPr algn="l" fontAlgn="ctr"/>
                       <a:r>
-                        <a:rPr lang="en-US" sz="1400" u="none" strike="noStrike">
+                        <a:rPr lang="en-US" sz="1400" u="none" strike="noStrike" dirty="0" smtClean="0">
                           <a:effectLst/>
                         </a:rPr>
-                        <a:t> </a:t>
+                        <a:t>The</a:t>
                       </a:r>
-                      <a:endParaRPr lang="en-US" sz="1400" b="0" i="0" u="none" strike="noStrike">
+                      <a:r>
+                        <a:rPr lang="en-US" sz="1400" u="none" strike="noStrike" baseline="0" dirty="0" smtClean="0">
+                          <a:effectLst/>
+                        </a:rPr>
+                        <a:t> number of daily need &amp; ratio</a:t>
+                      </a:r>
+                      <a:r>
+                        <a:rPr lang="en-US" sz="1400" u="none" strike="noStrike" dirty="0" smtClean="0">
+                          <a:effectLst/>
+                        </a:rPr>
+                        <a:t> </a:t>
+                      </a:r>
+                      <a:endParaRPr lang="en-US" sz="1400" b="0" i="0" u="none" strike="noStrike" dirty="0">
                         <a:solidFill>
                           <a:srgbClr val="000000"/>
                         </a:solidFill>
@@ -13088,7 +16697,7 @@
           <p:nvPr>
             <p:extLst>
               <p:ext uri="{D42A27DB-BD31-4B8C-83A1-F6EECF244321}">
-                <p14:modId xmlns:p14="http://schemas.microsoft.com/office/powerpoint/2010/main" val="2537580465"/>
+                <p14:modId xmlns:p14="http://schemas.microsoft.com/office/powerpoint/2010/main" val="914651443"/>
               </p:ext>
             </p:extLst>
           </p:nvPr>
@@ -14096,12 +17705,12 @@
                     <a:p>
                       <a:pPr algn="ctr" fontAlgn="ctr"/>
                       <a:r>
-                        <a:rPr lang="en-US" sz="1400" u="none" strike="noStrike">
+                        <a:rPr lang="en-US" sz="1400" u="none" strike="noStrike" dirty="0" smtClean="0">
                           <a:effectLst/>
                         </a:rPr>
-                        <a:t>0%</a:t>
+                        <a:t>50%</a:t>
                       </a:r>
-                      <a:endParaRPr lang="en-US" sz="1400" b="0" i="0" u="none" strike="noStrike">
+                      <a:endParaRPr lang="en-US" sz="1400" b="0" i="0" u="none" strike="noStrike" dirty="0">
                         <a:solidFill>
                           <a:srgbClr val="000000"/>
                         </a:solidFill>
@@ -14119,12 +17728,26 @@
                     <a:p>
                       <a:pPr algn="l" fontAlgn="ctr"/>
                       <a:r>
-                        <a:rPr lang="en-US" sz="1400" u="none" strike="noStrike">
+                        <a:rPr lang="en-US" sz="1400" b="0" i="0" u="none" strike="noStrike" dirty="0" smtClean="0">
+                          <a:solidFill>
+                            <a:schemeClr val="dk1"/>
+                          </a:solidFill>
                           <a:effectLst/>
+                          <a:latin typeface="+mn-lt"/>
                         </a:rPr>
-                        <a:t> </a:t>
+                        <a:t>Rough</a:t>
                       </a:r>
-                      <a:endParaRPr lang="en-US" sz="1400" b="0" i="0" u="none" strike="noStrike">
+                      <a:r>
+                        <a:rPr lang="en-US" sz="1400" b="0" i="0" u="none" strike="noStrike" baseline="0" dirty="0" smtClean="0">
+                          <a:solidFill>
+                            <a:schemeClr val="dk1"/>
+                          </a:solidFill>
+                          <a:effectLst/>
+                          <a:latin typeface="+mn-lt"/>
+                        </a:rPr>
+                        <a:t> sketch</a:t>
+                      </a:r>
+                      <a:endParaRPr lang="en-US" sz="1400" b="0" i="0" u="none" strike="noStrike" dirty="0">
                         <a:solidFill>
                           <a:srgbClr val="000000"/>
                         </a:solidFill>
@@ -14384,6 +18007,30 @@
           <a:chExt cx="0" cy="0"/>
         </a:xfrm>
       </p:grpSpPr>
+      <p:graphicFrame>
+        <p:nvGraphicFramePr>
+          <p:cNvPr id="20" name="Chart 19"/>
+          <p:cNvGraphicFramePr>
+            <a:graphicFrameLocks/>
+          </p:cNvGraphicFramePr>
+          <p:nvPr>
+            <p:extLst>
+              <p:ext uri="{D42A27DB-BD31-4B8C-83A1-F6EECF244321}">
+                <p14:modId xmlns:p14="http://schemas.microsoft.com/office/powerpoint/2010/main" val="787400739"/>
+              </p:ext>
+            </p:extLst>
+          </p:nvPr>
+        </p:nvGraphicFramePr>
+        <p:xfrm>
+          <a:off x="153917" y="1643630"/>
+          <a:ext cx="5408683" cy="3366519"/>
+        </p:xfrm>
+        <a:graphic>
+          <a:graphicData uri="http://schemas.openxmlformats.org/drawingml/2006/chart">
+            <c:chart xmlns:c="http://schemas.openxmlformats.org/drawingml/2006/chart" xmlns:r="http://schemas.openxmlformats.org/officeDocument/2006/relationships" r:id="rId2"/>
+          </a:graphicData>
+        </a:graphic>
+      </p:graphicFrame>
       <p:sp>
         <p:nvSpPr>
           <p:cNvPr id="2" name="Title 1"/>
@@ -14558,7 +18205,7 @@
           <p:spPr>
             <a:xfrm>
               <a:off x="153916" y="1160090"/>
-              <a:ext cx="2803596" cy="400110"/>
+              <a:ext cx="3503684" cy="400110"/>
             </a:xfrm>
             <a:prstGeom prst="rect">
               <a:avLst/>
@@ -14577,7 +18224,15 @@
                     <a:schemeClr val="bg1"/>
                   </a:solidFill>
                 </a:rPr>
-                <a:t>Market Size</a:t>
+                <a:t>Market </a:t>
+              </a:r>
+              <a:r>
+                <a:rPr lang="en-US" sz="2000" dirty="0" smtClean="0">
+                  <a:solidFill>
+                    <a:schemeClr val="bg1"/>
+                  </a:solidFill>
+                </a:rPr>
+                <a:t>Size – Impact Assessment</a:t>
               </a:r>
               <a:endParaRPr lang="en-US" sz="2000" dirty="0">
                 <a:solidFill>
@@ -14588,30 +18243,6 @@
           </p:txBody>
         </p:sp>
       </p:grpSp>
-      <p:graphicFrame>
-        <p:nvGraphicFramePr>
-          <p:cNvPr id="10" name="Chart 9"/>
-          <p:cNvGraphicFramePr>
-            <a:graphicFrameLocks/>
-          </p:cNvGraphicFramePr>
-          <p:nvPr>
-            <p:extLst>
-              <p:ext uri="{D42A27DB-BD31-4B8C-83A1-F6EECF244321}">
-                <p14:modId xmlns:p14="http://schemas.microsoft.com/office/powerpoint/2010/main" val="1802090361"/>
-              </p:ext>
-            </p:extLst>
-          </p:nvPr>
-        </p:nvGraphicFramePr>
-        <p:xfrm>
-          <a:off x="172966" y="1657350"/>
-          <a:ext cx="5029200" cy="3364256"/>
-        </p:xfrm>
-        <a:graphic>
-          <a:graphicData uri="http://schemas.openxmlformats.org/drawingml/2006/chart">
-            <c:chart xmlns:c="http://schemas.openxmlformats.org/drawingml/2006/chart" xmlns:r="http://schemas.openxmlformats.org/officeDocument/2006/relationships" r:id="rId2"/>
-          </a:graphicData>
-        </a:graphic>
-      </p:graphicFrame>
       <p:graphicFrame>
         <p:nvGraphicFramePr>
           <p:cNvPr id="11" name="Chart 10"/>
@@ -14653,8 +18284,8 @@
               <a:gd name="adj2" fmla="val -8333"/>
               <a:gd name="adj3" fmla="val 18750"/>
               <a:gd name="adj4" fmla="val -16667"/>
-              <a:gd name="adj5" fmla="val 49038"/>
-              <a:gd name="adj6" fmla="val -50935"/>
+              <a:gd name="adj5" fmla="val 65361"/>
+              <a:gd name="adj6" fmla="val -42369"/>
             </a:avLst>
           </a:prstGeom>
           <a:noFill/>
@@ -15040,107 +18671,6 @@
           </a:p>
         </p:txBody>
       </p:sp>
-      <p:grpSp>
-        <p:nvGrpSpPr>
-          <p:cNvPr id="5" name="Group 4"/>
-          <p:cNvGrpSpPr/>
-          <p:nvPr/>
-        </p:nvGrpSpPr>
-        <p:grpSpPr>
-          <a:xfrm>
-            <a:off x="1733" y="1150595"/>
-            <a:ext cx="3960667" cy="419100"/>
-            <a:chOff x="1733" y="1150595"/>
-            <a:chExt cx="3960667" cy="419100"/>
-          </a:xfrm>
-        </p:grpSpPr>
-        <p:sp>
-          <p:nvSpPr>
-            <p:cNvPr id="6" name="Pentagon 5"/>
-            <p:cNvSpPr/>
-            <p:nvPr/>
-          </p:nvSpPr>
-          <p:spPr>
-            <a:xfrm>
-              <a:off x="1733" y="1150595"/>
-              <a:ext cx="3960667" cy="419100"/>
-            </a:xfrm>
-            <a:prstGeom prst="homePlate">
-              <a:avLst/>
-            </a:prstGeom>
-            <a:solidFill>
-              <a:srgbClr val="505050"/>
-            </a:solidFill>
-            <a:ln>
-              <a:solidFill>
-                <a:srgbClr val="505050"/>
-              </a:solidFill>
-            </a:ln>
-          </p:spPr>
-          <p:style>
-            <a:lnRef idx="2">
-              <a:schemeClr val="accent1">
-                <a:shade val="50000"/>
-              </a:schemeClr>
-            </a:lnRef>
-            <a:fillRef idx="1">
-              <a:schemeClr val="accent1"/>
-            </a:fillRef>
-            <a:effectRef idx="0">
-              <a:schemeClr val="accent1"/>
-            </a:effectRef>
-            <a:fontRef idx="minor">
-              <a:schemeClr val="lt1"/>
-            </a:fontRef>
-          </p:style>
-          <p:txBody>
-            <a:bodyPr rtlCol="0" anchor="ctr"/>
-            <a:lstStyle/>
-            <a:p>
-              <a:pPr algn="ctr"/>
-              <a:endParaRPr lang="en-US"/>
-            </a:p>
-          </p:txBody>
-        </p:sp>
-        <p:sp>
-          <p:nvSpPr>
-            <p:cNvPr id="7" name="TextBox 6"/>
-            <p:cNvSpPr txBox="1"/>
-            <p:nvPr/>
-          </p:nvSpPr>
-          <p:spPr>
-            <a:xfrm>
-              <a:off x="153916" y="1160090"/>
-              <a:ext cx="2803596" cy="400110"/>
-            </a:xfrm>
-            <a:prstGeom prst="rect">
-              <a:avLst/>
-            </a:prstGeom>
-            <a:noFill/>
-          </p:spPr>
-          <p:txBody>
-            <a:bodyPr wrap="square" rtlCol="0">
-              <a:spAutoFit/>
-            </a:bodyPr>
-            <a:lstStyle/>
-            <a:p>
-              <a:r>
-                <a:rPr lang="en-US" sz="2000" dirty="0" smtClean="0">
-                  <a:solidFill>
-                    <a:schemeClr val="bg1"/>
-                  </a:solidFill>
-                </a:rPr>
-                <a:t>Market Size</a:t>
-              </a:r>
-              <a:endParaRPr lang="en-US" sz="2000" dirty="0">
-                <a:solidFill>
-                  <a:schemeClr val="bg1"/>
-                </a:solidFill>
-              </a:endParaRPr>
-            </a:p>
-          </p:txBody>
-        </p:sp>
-      </p:grpSp>
       <p:graphicFrame>
         <p:nvGraphicFramePr>
           <p:cNvPr id="8" name="Chart 7"/>
@@ -15453,6 +18983,200 @@
           </a:extLst>
         </p:spPr>
       </p:pic>
+      <p:sp>
+        <p:nvSpPr>
+          <p:cNvPr id="15" name="Line Callout 2 14"/>
+          <p:cNvSpPr/>
+          <p:nvPr/>
+        </p:nvSpPr>
+        <p:spPr>
+          <a:xfrm>
+            <a:off x="5737303" y="1962150"/>
+            <a:ext cx="3124200" cy="838200"/>
+          </a:xfrm>
+          <a:prstGeom prst="borderCallout2">
+            <a:avLst>
+              <a:gd name="adj1" fmla="val 71965"/>
+              <a:gd name="adj2" fmla="val -5478"/>
+              <a:gd name="adj3" fmla="val 111877"/>
+              <a:gd name="adj4" fmla="val -44508"/>
+              <a:gd name="adj5" fmla="val 284764"/>
+              <a:gd name="adj6" fmla="val -110869"/>
+            </a:avLst>
+          </a:prstGeom>
+          <a:noFill/>
+          <a:ln w="28575">
+            <a:solidFill>
+              <a:srgbClr val="129793"/>
+            </a:solidFill>
+            <a:prstDash val="dash"/>
+          </a:ln>
+        </p:spPr>
+        <p:style>
+          <a:lnRef idx="2">
+            <a:schemeClr val="accent1">
+              <a:shade val="50000"/>
+            </a:schemeClr>
+          </a:lnRef>
+          <a:fillRef idx="1">
+            <a:schemeClr val="accent1"/>
+          </a:fillRef>
+          <a:effectRef idx="0">
+            <a:schemeClr val="accent1"/>
+          </a:effectRef>
+          <a:fontRef idx="minor">
+            <a:schemeClr val="lt1"/>
+          </a:fontRef>
+        </p:style>
+        <p:txBody>
+          <a:bodyPr rtlCol="0" anchor="ctr"/>
+          <a:lstStyle/>
+          <a:p>
+            <a:r>
+              <a:rPr lang="en-US" sz="1400" dirty="0" smtClean="0">
+                <a:solidFill>
+                  <a:srgbClr val="505050"/>
+                </a:solidFill>
+              </a:rPr>
+              <a:t>$4 for tofu</a:t>
+            </a:r>
+          </a:p>
+          <a:p>
+            <a:r>
+              <a:rPr lang="en-US" sz="1400" dirty="0" smtClean="0">
+                <a:solidFill>
+                  <a:srgbClr val="505050"/>
+                </a:solidFill>
+              </a:rPr>
+              <a:t>$12 for veggie sausage</a:t>
+            </a:r>
+          </a:p>
+          <a:p>
+            <a:r>
+              <a:rPr lang="en-US" sz="1400" dirty="0" smtClean="0">
+                <a:solidFill>
+                  <a:srgbClr val="505050"/>
+                </a:solidFill>
+              </a:rPr>
+              <a:t>$6 for veggie burger</a:t>
+            </a:r>
+            <a:endParaRPr lang="en-US" sz="1400" dirty="0">
+              <a:solidFill>
+                <a:srgbClr val="505050"/>
+              </a:solidFill>
+            </a:endParaRPr>
+          </a:p>
+        </p:txBody>
+      </p:sp>
+      <p:grpSp>
+        <p:nvGrpSpPr>
+          <p:cNvPr id="17" name="Group 16"/>
+          <p:cNvGrpSpPr/>
+          <p:nvPr/>
+        </p:nvGrpSpPr>
+        <p:grpSpPr>
+          <a:xfrm>
+            <a:off x="1733" y="1150595"/>
+            <a:ext cx="3960667" cy="419100"/>
+            <a:chOff x="1733" y="1150595"/>
+            <a:chExt cx="3960667" cy="419100"/>
+          </a:xfrm>
+        </p:grpSpPr>
+        <p:sp>
+          <p:nvSpPr>
+            <p:cNvPr id="18" name="Pentagon 17"/>
+            <p:cNvSpPr/>
+            <p:nvPr/>
+          </p:nvSpPr>
+          <p:spPr>
+            <a:xfrm>
+              <a:off x="1733" y="1150595"/>
+              <a:ext cx="3960667" cy="419100"/>
+            </a:xfrm>
+            <a:prstGeom prst="homePlate">
+              <a:avLst/>
+            </a:prstGeom>
+            <a:solidFill>
+              <a:srgbClr val="505050"/>
+            </a:solidFill>
+            <a:ln>
+              <a:solidFill>
+                <a:srgbClr val="505050"/>
+              </a:solidFill>
+            </a:ln>
+          </p:spPr>
+          <p:style>
+            <a:lnRef idx="2">
+              <a:schemeClr val="accent1">
+                <a:shade val="50000"/>
+              </a:schemeClr>
+            </a:lnRef>
+            <a:fillRef idx="1">
+              <a:schemeClr val="accent1"/>
+            </a:fillRef>
+            <a:effectRef idx="0">
+              <a:schemeClr val="accent1"/>
+            </a:effectRef>
+            <a:fontRef idx="minor">
+              <a:schemeClr val="lt1"/>
+            </a:fontRef>
+          </p:style>
+          <p:txBody>
+            <a:bodyPr rtlCol="0" anchor="ctr"/>
+            <a:lstStyle/>
+            <a:p>
+              <a:pPr algn="ctr"/>
+              <a:endParaRPr lang="en-US"/>
+            </a:p>
+          </p:txBody>
+        </p:sp>
+        <p:sp>
+          <p:nvSpPr>
+            <p:cNvPr id="19" name="TextBox 18"/>
+            <p:cNvSpPr txBox="1"/>
+            <p:nvPr/>
+          </p:nvSpPr>
+          <p:spPr>
+            <a:xfrm>
+              <a:off x="153916" y="1160090"/>
+              <a:ext cx="3503684" cy="400110"/>
+            </a:xfrm>
+            <a:prstGeom prst="rect">
+              <a:avLst/>
+            </a:prstGeom>
+            <a:noFill/>
+          </p:spPr>
+          <p:txBody>
+            <a:bodyPr wrap="square" rtlCol="0">
+              <a:spAutoFit/>
+            </a:bodyPr>
+            <a:lstStyle/>
+            <a:p>
+              <a:r>
+                <a:rPr lang="en-US" sz="2000" dirty="0" smtClean="0">
+                  <a:solidFill>
+                    <a:schemeClr val="bg1"/>
+                  </a:solidFill>
+                </a:rPr>
+                <a:t>Market </a:t>
+              </a:r>
+              <a:r>
+                <a:rPr lang="en-US" sz="2000" dirty="0" smtClean="0">
+                  <a:solidFill>
+                    <a:schemeClr val="bg1"/>
+                  </a:solidFill>
+                </a:rPr>
+                <a:t>Size – Impact Assessment</a:t>
+              </a:r>
+              <a:endParaRPr lang="en-US" sz="2000" dirty="0">
+                <a:solidFill>
+                  <a:schemeClr val="bg1"/>
+                </a:solidFill>
+              </a:endParaRPr>
+            </a:p>
+          </p:txBody>
+        </p:sp>
+      </p:grpSp>
     </p:spTree>
     <p:extLst>
       <p:ext uri="{BB962C8B-B14F-4D97-AF65-F5344CB8AC3E}">

</xml_diff>